<commit_message>
Change inlet flux to surface wind stress, after feedback at MPAS meeting.
</commit_message>
<xml_diff>
--- a/ocean/current_design_doc/sub-ice_shelf_ocean_test/f/sub-ice_shelf_diagram1.pptx
+++ b/ocean/current_design_doc/sub-ice_shelf_ocean_test/f/sub-ice_shelf_diagram1.pptx
@@ -6,7 +6,9 @@
   </p:sldMasterIdLst>
   <p:sldIdLst>
     <p:sldId id="256" r:id="rId2"/>
-    <p:sldId id="258" r:id="rId3"/>
+    <p:sldId id="259" r:id="rId3"/>
+    <p:sldId id="260" r:id="rId4"/>
+    <p:sldId id="258" r:id="rId5"/>
   </p:sldIdLst>
   <p:sldSz cx="9144000" cy="6858000" type="screen4x3"/>
   <p:notesSz cx="6858000" cy="9144000"/>
@@ -4271,6 +4273,152 @@
           </a:p>
         </p:txBody>
       </p:sp>
+      <p:cxnSp>
+        <p:nvCxnSpPr>
+          <p:cNvPr id="54" name="Straight Arrow Connector 53"/>
+          <p:cNvCxnSpPr/>
+          <p:nvPr/>
+        </p:nvCxnSpPr>
+        <p:spPr>
+          <a:xfrm flipV="1">
+            <a:off x="429399" y="4724401"/>
+            <a:ext cx="0" cy="304799"/>
+          </a:xfrm>
+          <a:prstGeom prst="straightConnector1">
+            <a:avLst/>
+          </a:prstGeom>
+          <a:ln>
+            <a:solidFill>
+              <a:schemeClr val="tx1"/>
+            </a:solidFill>
+            <a:headEnd type="none"/>
+            <a:tailEnd type="arrow"/>
+          </a:ln>
+        </p:spPr>
+        <p:style>
+          <a:lnRef idx="2">
+            <a:schemeClr val="accent1"/>
+          </a:lnRef>
+          <a:fillRef idx="0">
+            <a:schemeClr val="accent1"/>
+          </a:fillRef>
+          <a:effectRef idx="1">
+            <a:schemeClr val="accent1"/>
+          </a:effectRef>
+          <a:fontRef idx="minor">
+            <a:schemeClr val="tx1"/>
+          </a:fontRef>
+        </p:style>
+      </p:cxnSp>
+      <p:cxnSp>
+        <p:nvCxnSpPr>
+          <p:cNvPr id="55" name="Straight Arrow Connector 54"/>
+          <p:cNvCxnSpPr/>
+          <p:nvPr/>
+        </p:nvCxnSpPr>
+        <p:spPr>
+          <a:xfrm rot="5400000" flipV="1">
+            <a:off x="581799" y="4876801"/>
+            <a:ext cx="0" cy="304799"/>
+          </a:xfrm>
+          <a:prstGeom prst="straightConnector1">
+            <a:avLst/>
+          </a:prstGeom>
+          <a:ln>
+            <a:solidFill>
+              <a:schemeClr val="tx1"/>
+            </a:solidFill>
+            <a:headEnd type="none"/>
+            <a:tailEnd type="arrow"/>
+          </a:ln>
+        </p:spPr>
+        <p:style>
+          <a:lnRef idx="2">
+            <a:schemeClr val="accent1"/>
+          </a:lnRef>
+          <a:fillRef idx="0">
+            <a:schemeClr val="accent1"/>
+          </a:fillRef>
+          <a:effectRef idx="1">
+            <a:schemeClr val="accent1"/>
+          </a:effectRef>
+          <a:fontRef idx="minor">
+            <a:schemeClr val="tx1"/>
+          </a:fontRef>
+        </p:style>
+      </p:cxnSp>
+      <p:sp>
+        <p:nvSpPr>
+          <p:cNvPr id="56" name="TextBox 55"/>
+          <p:cNvSpPr txBox="1"/>
+          <p:nvPr/>
+        </p:nvSpPr>
+        <p:spPr>
+          <a:xfrm>
+            <a:off x="657999" y="4828401"/>
+            <a:ext cx="317450" cy="276999"/>
+          </a:xfrm>
+          <a:prstGeom prst="rect">
+            <a:avLst/>
+          </a:prstGeom>
+          <a:noFill/>
+        </p:spPr>
+        <p:txBody>
+          <a:bodyPr wrap="none" rtlCol="0">
+            <a:spAutoFit/>
+          </a:bodyPr>
+          <a:lstStyle/>
+          <a:p>
+            <a:r>
+              <a:rPr lang="en-US" sz="1200" i="1" dirty="0" smtClean="0">
+                <a:latin typeface="Bookman Old Style"/>
+                <a:cs typeface="Bookman Old Style"/>
+              </a:rPr>
+              <a:t>y</a:t>
+            </a:r>
+            <a:endParaRPr lang="en-US" sz="1200" i="1" dirty="0">
+              <a:latin typeface="Bookman Old Style"/>
+              <a:cs typeface="Bookman Old Style"/>
+            </a:endParaRPr>
+          </a:p>
+        </p:txBody>
+      </p:sp>
+      <p:sp>
+        <p:nvSpPr>
+          <p:cNvPr id="57" name="TextBox 56"/>
+          <p:cNvSpPr txBox="1"/>
+          <p:nvPr/>
+        </p:nvSpPr>
+        <p:spPr>
+          <a:xfrm>
+            <a:off x="429399" y="4572000"/>
+            <a:ext cx="305127" cy="276999"/>
+          </a:xfrm>
+          <a:prstGeom prst="rect">
+            <a:avLst/>
+          </a:prstGeom>
+          <a:noFill/>
+        </p:spPr>
+        <p:txBody>
+          <a:bodyPr wrap="none" rtlCol="0">
+            <a:spAutoFit/>
+          </a:bodyPr>
+          <a:lstStyle/>
+          <a:p>
+            <a:r>
+              <a:rPr lang="en-US" sz="1200" i="1" dirty="0" smtClean="0">
+                <a:latin typeface="Bookman Old Style"/>
+                <a:cs typeface="Bookman Old Style"/>
+              </a:rPr>
+              <a:t>z</a:t>
+            </a:r>
+            <a:endParaRPr lang="en-US" sz="1200" i="1" dirty="0">
+              <a:latin typeface="Bookman Old Style"/>
+              <a:cs typeface="Bookman Old Style"/>
+            </a:endParaRPr>
+          </a:p>
+        </p:txBody>
+      </p:sp>
     </p:spTree>
     <p:extLst>
       <p:ext uri="{BB962C8B-B14F-4D97-AF65-F5344CB8AC3E}">
@@ -4469,14 +4617,51 @@
       </p:sp>
       <p:cxnSp>
         <p:nvCxnSpPr>
+          <p:cNvPr id="9" name="Straight Arrow Connector 8"/>
+          <p:cNvCxnSpPr/>
+          <p:nvPr/>
+        </p:nvCxnSpPr>
+        <p:spPr>
+          <a:xfrm>
+            <a:off x="1285023" y="4718050"/>
+            <a:ext cx="812235" cy="6350"/>
+          </a:xfrm>
+          <a:prstGeom prst="straightConnector1">
+            <a:avLst/>
+          </a:prstGeom>
+          <a:ln>
+            <a:solidFill>
+              <a:schemeClr val="tx1"/>
+            </a:solidFill>
+            <a:headEnd type="arrow"/>
+            <a:tailEnd type="arrow"/>
+          </a:ln>
+        </p:spPr>
+        <p:style>
+          <a:lnRef idx="2">
+            <a:schemeClr val="accent1"/>
+          </a:lnRef>
+          <a:fillRef idx="0">
+            <a:schemeClr val="accent1"/>
+          </a:fillRef>
+          <a:effectRef idx="1">
+            <a:schemeClr val="accent1"/>
+          </a:effectRef>
+          <a:fontRef idx="minor">
+            <a:schemeClr val="tx1"/>
+          </a:fontRef>
+        </p:style>
+      </p:cxnSp>
+      <p:cxnSp>
+        <p:nvCxnSpPr>
           <p:cNvPr id="11" name="Straight Arrow Connector 10"/>
           <p:cNvCxnSpPr/>
           <p:nvPr/>
         </p:nvCxnSpPr>
         <p:spPr>
           <a:xfrm>
-            <a:off x="1285023" y="4724400"/>
-            <a:ext cx="1794961" cy="0"/>
+            <a:off x="2097258" y="4724400"/>
+            <a:ext cx="1917758" cy="0"/>
           </a:xfrm>
           <a:prstGeom prst="straightConnector1">
             <a:avLst/>
@@ -4512,8 +4697,8 @@
         </p:nvCxnSpPr>
         <p:spPr>
           <a:xfrm>
-            <a:off x="3124200" y="4724400"/>
-            <a:ext cx="2209800" cy="0"/>
+            <a:off x="4015016" y="4724400"/>
+            <a:ext cx="4025900" cy="0"/>
           </a:xfrm>
           <a:prstGeom prst="straightConnector1">
             <a:avLst/>
@@ -4543,13 +4728,73 @@
       </p:cxnSp>
       <p:sp>
         <p:nvSpPr>
+          <p:cNvPr id="16" name="TextBox 15"/>
+          <p:cNvSpPr txBox="1"/>
+          <p:nvPr/>
+        </p:nvSpPr>
+        <p:spPr>
+          <a:xfrm>
+            <a:off x="1348016" y="4419600"/>
+            <a:ext cx="568335" cy="276999"/>
+          </a:xfrm>
+          <a:prstGeom prst="rect">
+            <a:avLst/>
+          </a:prstGeom>
+          <a:noFill/>
+        </p:spPr>
+        <p:txBody>
+          <a:bodyPr wrap="none" rtlCol="0">
+            <a:spAutoFit/>
+          </a:bodyPr>
+          <a:lstStyle/>
+          <a:p>
+            <a:r>
+              <a:rPr lang="en-US" sz="1200" dirty="0" smtClean="0"/>
+              <a:t>15 km</a:t>
+            </a:r>
+            <a:endParaRPr lang="en-US" sz="1200" dirty="0"/>
+          </a:p>
+        </p:txBody>
+      </p:sp>
+      <p:sp>
+        <p:nvSpPr>
+          <p:cNvPr id="17" name="TextBox 16"/>
+          <p:cNvSpPr txBox="1"/>
+          <p:nvPr/>
+        </p:nvSpPr>
+        <p:spPr>
+          <a:xfrm>
+            <a:off x="5580281" y="4419600"/>
+            <a:ext cx="646331" cy="276999"/>
+          </a:xfrm>
+          <a:prstGeom prst="rect">
+            <a:avLst/>
+          </a:prstGeom>
+          <a:noFill/>
+        </p:spPr>
+        <p:txBody>
+          <a:bodyPr wrap="none" rtlCol="0">
+            <a:spAutoFit/>
+          </a:bodyPr>
+          <a:lstStyle/>
+          <a:p>
+            <a:r>
+              <a:rPr lang="en-US" sz="1200" dirty="0" smtClean="0"/>
+              <a:t>155 km</a:t>
+            </a:r>
+            <a:endParaRPr lang="en-US" sz="1200" dirty="0"/>
+          </a:p>
+        </p:txBody>
+      </p:sp>
+      <p:sp>
+        <p:nvSpPr>
           <p:cNvPr id="18" name="TextBox 17"/>
           <p:cNvSpPr txBox="1"/>
           <p:nvPr/>
         </p:nvSpPr>
         <p:spPr>
           <a:xfrm>
-            <a:off x="1870065" y="4419600"/>
+            <a:off x="2795816" y="4419600"/>
             <a:ext cx="568335" cy="276999"/>
           </a:xfrm>
           <a:prstGeom prst="rect">
@@ -4638,120 +4883,16 @@
           </a:p>
         </p:txBody>
       </p:sp>
-      <p:sp>
-        <p:nvSpPr>
-          <p:cNvPr id="32" name="Right Arrow 31"/>
-          <p:cNvSpPr/>
-          <p:nvPr/>
-        </p:nvSpPr>
-        <p:spPr>
-          <a:xfrm>
-            <a:off x="1348016" y="4038600"/>
-            <a:ext cx="457200" cy="228600"/>
-          </a:xfrm>
-          <a:prstGeom prst="rightArrow">
-            <a:avLst/>
-          </a:prstGeom>
-        </p:spPr>
-        <p:style>
-          <a:lnRef idx="1">
-            <a:schemeClr val="accent1"/>
-          </a:lnRef>
-          <a:fillRef idx="3">
-            <a:schemeClr val="accent1"/>
-          </a:fillRef>
-          <a:effectRef idx="2">
-            <a:schemeClr val="accent1"/>
-          </a:effectRef>
-          <a:fontRef idx="minor">
-            <a:schemeClr val="lt1"/>
-          </a:fontRef>
-        </p:style>
-        <p:txBody>
-          <a:bodyPr rtlCol="0" anchor="ctr"/>
-          <a:lstStyle/>
-          <a:p>
-            <a:pPr algn="ctr"/>
-            <a:endParaRPr lang="en-US"/>
-          </a:p>
-        </p:txBody>
-      </p:sp>
-      <p:sp>
-        <p:nvSpPr>
-          <p:cNvPr id="44" name="TextBox 43"/>
-          <p:cNvSpPr txBox="1"/>
-          <p:nvPr/>
-        </p:nvSpPr>
-        <p:spPr>
-          <a:xfrm>
-            <a:off x="1485582" y="1600200"/>
-            <a:ext cx="3139033" cy="276999"/>
-          </a:xfrm>
-          <a:prstGeom prst="rect">
-            <a:avLst/>
-          </a:prstGeom>
-          <a:noFill/>
-        </p:spPr>
-        <p:txBody>
-          <a:bodyPr wrap="square" rtlCol="0">
-            <a:spAutoFit/>
-          </a:bodyPr>
-          <a:lstStyle/>
-          <a:p>
-            <a:r>
-              <a:rPr lang="en-US" sz="1200" dirty="0" smtClean="0"/>
-              <a:t>ice shelf, imposed by surface pressure</a:t>
-            </a:r>
-            <a:endParaRPr lang="en-US" sz="1200" dirty="0"/>
-          </a:p>
-        </p:txBody>
-      </p:sp>
-      <p:sp>
-        <p:nvSpPr>
-          <p:cNvPr id="45" name="TextBox 44"/>
-          <p:cNvSpPr txBox="1"/>
-          <p:nvPr/>
-        </p:nvSpPr>
-        <p:spPr>
-          <a:xfrm>
-            <a:off x="5580281" y="1984166"/>
-            <a:ext cx="1767433" cy="461665"/>
-          </a:xfrm>
-          <a:prstGeom prst="rect">
-            <a:avLst/>
-          </a:prstGeom>
-          <a:noFill/>
-        </p:spPr>
-        <p:txBody>
-          <a:bodyPr wrap="square" rtlCol="0">
-            <a:spAutoFit/>
-          </a:bodyPr>
-          <a:lstStyle/>
-          <a:p>
-            <a:r>
-              <a:rPr lang="en-US" sz="1200" dirty="0" smtClean="0"/>
-              <a:t>MPAS-Ocean model </a:t>
-            </a:r>
-          </a:p>
-          <a:p>
-            <a:r>
-              <a:rPr lang="en-US" sz="1200" dirty="0" smtClean="0"/>
-              <a:t>22 layers, 50 m each </a:t>
-            </a:r>
-            <a:endParaRPr lang="en-US" sz="1200" dirty="0"/>
-          </a:p>
-        </p:txBody>
-      </p:sp>
       <p:cxnSp>
         <p:nvCxnSpPr>
-          <p:cNvPr id="51" name="Straight Arrow Connector 50"/>
+          <p:cNvPr id="22" name="Straight Arrow Connector 21"/>
           <p:cNvCxnSpPr/>
           <p:nvPr/>
         </p:nvCxnSpPr>
         <p:spPr>
           <a:xfrm flipV="1">
-            <a:off x="1066800" y="1600201"/>
-            <a:ext cx="0" cy="2823864"/>
+            <a:off x="1104116" y="3962400"/>
+            <a:ext cx="0" cy="406400"/>
           </a:xfrm>
           <a:prstGeom prst="straightConnector1">
             <a:avLst/>
@@ -4781,6 +4922,2887 @@
       </p:cxnSp>
       <p:sp>
         <p:nvSpPr>
+          <p:cNvPr id="23" name="TextBox 22"/>
+          <p:cNvSpPr txBox="1"/>
+          <p:nvPr/>
+        </p:nvSpPr>
+        <p:spPr>
+          <a:xfrm>
+            <a:off x="369892" y="3962400"/>
+            <a:ext cx="749524" cy="461665"/>
+          </a:xfrm>
+          <a:prstGeom prst="rect">
+            <a:avLst/>
+          </a:prstGeom>
+          <a:noFill/>
+        </p:spPr>
+        <p:txBody>
+          <a:bodyPr wrap="none" rtlCol="0">
+            <a:spAutoFit/>
+          </a:bodyPr>
+          <a:lstStyle/>
+          <a:p>
+            <a:pPr algn="r"/>
+            <a:r>
+              <a:rPr lang="en-US" sz="1200" dirty="0" smtClean="0"/>
+              <a:t>A: 100 m</a:t>
+            </a:r>
+          </a:p>
+          <a:p>
+            <a:pPr algn="r"/>
+            <a:r>
+              <a:rPr lang="en-US" sz="1200" dirty="0" smtClean="0"/>
+              <a:t>(varies)</a:t>
+            </a:r>
+            <a:endParaRPr lang="en-US" sz="1200" dirty="0"/>
+          </a:p>
+        </p:txBody>
+      </p:sp>
+      <p:cxnSp>
+        <p:nvCxnSpPr>
+          <p:cNvPr id="25" name="Straight Arrow Connector 24"/>
+          <p:cNvCxnSpPr/>
+          <p:nvPr/>
+        </p:nvCxnSpPr>
+        <p:spPr>
+          <a:xfrm flipV="1">
+            <a:off x="1097766" y="2819399"/>
+            <a:ext cx="0" cy="1143001"/>
+          </a:xfrm>
+          <a:prstGeom prst="straightConnector1">
+            <a:avLst/>
+          </a:prstGeom>
+          <a:ln>
+            <a:solidFill>
+              <a:schemeClr val="tx1"/>
+            </a:solidFill>
+            <a:headEnd type="arrow"/>
+            <a:tailEnd type="arrow"/>
+          </a:ln>
+        </p:spPr>
+        <p:style>
+          <a:lnRef idx="2">
+            <a:schemeClr val="accent1"/>
+          </a:lnRef>
+          <a:fillRef idx="0">
+            <a:schemeClr val="accent1"/>
+          </a:fillRef>
+          <a:effectRef idx="1">
+            <a:schemeClr val="accent1"/>
+          </a:effectRef>
+          <a:fontRef idx="minor">
+            <a:schemeClr val="tx1"/>
+          </a:fontRef>
+        </p:style>
+      </p:cxnSp>
+      <p:cxnSp>
+        <p:nvCxnSpPr>
+          <p:cNvPr id="28" name="Straight Arrow Connector 27"/>
+          <p:cNvCxnSpPr/>
+          <p:nvPr/>
+        </p:nvCxnSpPr>
+        <p:spPr>
+          <a:xfrm flipV="1">
+            <a:off x="1097766" y="1600199"/>
+            <a:ext cx="0" cy="1219201"/>
+          </a:xfrm>
+          <a:prstGeom prst="straightConnector1">
+            <a:avLst/>
+          </a:prstGeom>
+          <a:ln>
+            <a:solidFill>
+              <a:schemeClr val="tx1"/>
+            </a:solidFill>
+            <a:headEnd type="arrow"/>
+            <a:tailEnd type="arrow"/>
+          </a:ln>
+        </p:spPr>
+        <p:style>
+          <a:lnRef idx="2">
+            <a:schemeClr val="accent1"/>
+          </a:lnRef>
+          <a:fillRef idx="0">
+            <a:schemeClr val="accent1"/>
+          </a:fillRef>
+          <a:effectRef idx="1">
+            <a:schemeClr val="accent1"/>
+          </a:effectRef>
+          <a:fontRef idx="minor">
+            <a:schemeClr val="tx1"/>
+          </a:fontRef>
+        </p:style>
+      </p:cxnSp>
+      <p:sp>
+        <p:nvSpPr>
+          <p:cNvPr id="30" name="TextBox 29"/>
+          <p:cNvSpPr txBox="1"/>
+          <p:nvPr/>
+        </p:nvSpPr>
+        <p:spPr>
+          <a:xfrm>
+            <a:off x="509816" y="3124200"/>
+            <a:ext cx="576375" cy="276999"/>
+          </a:xfrm>
+          <a:prstGeom prst="rect">
+            <a:avLst/>
+          </a:prstGeom>
+          <a:noFill/>
+        </p:spPr>
+        <p:txBody>
+          <a:bodyPr wrap="none" rtlCol="0">
+            <a:spAutoFit/>
+          </a:bodyPr>
+          <a:lstStyle/>
+          <a:p>
+            <a:r>
+              <a:rPr lang="en-US" sz="1200" dirty="0" smtClean="0"/>
+              <a:t>500 m</a:t>
+            </a:r>
+            <a:endParaRPr lang="en-US" sz="1200" dirty="0"/>
+          </a:p>
+        </p:txBody>
+      </p:sp>
+      <p:sp>
+        <p:nvSpPr>
+          <p:cNvPr id="31" name="TextBox 30"/>
+          <p:cNvSpPr txBox="1"/>
+          <p:nvPr/>
+        </p:nvSpPr>
+        <p:spPr>
+          <a:xfrm>
+            <a:off x="466097" y="1981200"/>
+            <a:ext cx="653319" cy="461665"/>
+          </a:xfrm>
+          <a:prstGeom prst="rect">
+            <a:avLst/>
+          </a:prstGeom>
+          <a:noFill/>
+        </p:spPr>
+        <p:txBody>
+          <a:bodyPr wrap="none" rtlCol="0">
+            <a:spAutoFit/>
+          </a:bodyPr>
+          <a:lstStyle/>
+          <a:p>
+            <a:pPr algn="r"/>
+            <a:r>
+              <a:rPr lang="en-US" sz="1200" dirty="0" smtClean="0"/>
+              <a:t>500 m</a:t>
+            </a:r>
+          </a:p>
+          <a:p>
+            <a:pPr algn="r"/>
+            <a:r>
+              <a:rPr lang="en-US" sz="1200" dirty="0" smtClean="0"/>
+              <a:t>(varies)</a:t>
+            </a:r>
+            <a:endParaRPr lang="en-US" sz="1200" dirty="0"/>
+          </a:p>
+        </p:txBody>
+      </p:sp>
+      <p:sp>
+        <p:nvSpPr>
+          <p:cNvPr id="35" name="TextBox 34"/>
+          <p:cNvSpPr txBox="1"/>
+          <p:nvPr/>
+        </p:nvSpPr>
+        <p:spPr>
+          <a:xfrm>
+            <a:off x="8062523" y="2362200"/>
+            <a:ext cx="983112" cy="1200329"/>
+          </a:xfrm>
+          <a:prstGeom prst="rect">
+            <a:avLst/>
+          </a:prstGeom>
+          <a:noFill/>
+        </p:spPr>
+        <p:txBody>
+          <a:bodyPr wrap="none" rtlCol="0">
+            <a:spAutoFit/>
+          </a:bodyPr>
+          <a:lstStyle/>
+          <a:p>
+            <a:r>
+              <a:rPr lang="en-US" sz="1200" dirty="0" smtClean="0"/>
+              <a:t>linear</a:t>
+            </a:r>
+          </a:p>
+          <a:p>
+            <a:r>
+              <a:rPr lang="en-US" sz="1200" dirty="0" smtClean="0"/>
+              <a:t>stratification</a:t>
+            </a:r>
+          </a:p>
+          <a:p>
+            <a:r>
+              <a:rPr lang="en-US" sz="1200" dirty="0" smtClean="0"/>
+              <a:t>in salinity in</a:t>
+            </a:r>
+          </a:p>
+          <a:p>
+            <a:r>
+              <a:rPr lang="en-US" sz="1200" dirty="0" smtClean="0"/>
+              <a:t>vert. only,</a:t>
+            </a:r>
+          </a:p>
+          <a:p>
+            <a:r>
+              <a:rPr lang="en-US" sz="1200" dirty="0" smtClean="0"/>
+              <a:t>constant</a:t>
+            </a:r>
+          </a:p>
+          <a:p>
+            <a:r>
+              <a:rPr lang="en-US" sz="1200" dirty="0" smtClean="0"/>
+              <a:t>temperature</a:t>
+            </a:r>
+            <a:endParaRPr lang="en-US" sz="1200" dirty="0"/>
+          </a:p>
+        </p:txBody>
+      </p:sp>
+      <p:sp>
+        <p:nvSpPr>
+          <p:cNvPr id="36" name="TextBox 35"/>
+          <p:cNvSpPr txBox="1"/>
+          <p:nvPr/>
+        </p:nvSpPr>
+        <p:spPr>
+          <a:xfrm>
+            <a:off x="8054146" y="1551801"/>
+            <a:ext cx="604853" cy="276999"/>
+          </a:xfrm>
+          <a:prstGeom prst="rect">
+            <a:avLst/>
+          </a:prstGeom>
+          <a:noFill/>
+        </p:spPr>
+        <p:txBody>
+          <a:bodyPr wrap="none" rtlCol="0">
+            <a:spAutoFit/>
+          </a:bodyPr>
+          <a:lstStyle/>
+          <a:p>
+            <a:r>
+              <a:rPr lang="en-US" sz="1200" dirty="0" smtClean="0"/>
+              <a:t>S=34.5</a:t>
+            </a:r>
+            <a:endParaRPr lang="en-US" sz="1200" dirty="0"/>
+          </a:p>
+        </p:txBody>
+      </p:sp>
+      <p:sp>
+        <p:nvSpPr>
+          <p:cNvPr id="37" name="TextBox 36"/>
+          <p:cNvSpPr txBox="1"/>
+          <p:nvPr/>
+        </p:nvSpPr>
+        <p:spPr>
+          <a:xfrm>
+            <a:off x="8051140" y="4114800"/>
+            <a:ext cx="607859" cy="276999"/>
+          </a:xfrm>
+          <a:prstGeom prst="rect">
+            <a:avLst/>
+          </a:prstGeom>
+          <a:noFill/>
+        </p:spPr>
+        <p:txBody>
+          <a:bodyPr wrap="none" rtlCol="0">
+            <a:spAutoFit/>
+          </a:bodyPr>
+          <a:lstStyle/>
+          <a:p>
+            <a:r>
+              <a:rPr lang="en-US" sz="1200" dirty="0" smtClean="0"/>
+              <a:t>S=34.7</a:t>
+            </a:r>
+            <a:endParaRPr lang="en-US" sz="1200" dirty="0"/>
+          </a:p>
+        </p:txBody>
+      </p:sp>
+      <p:sp>
+        <p:nvSpPr>
+          <p:cNvPr id="38" name="TextBox 37"/>
+          <p:cNvSpPr txBox="1"/>
+          <p:nvPr/>
+        </p:nvSpPr>
+        <p:spPr>
+          <a:xfrm>
+            <a:off x="1916351" y="3121287"/>
+            <a:ext cx="1262076" cy="276999"/>
+          </a:xfrm>
+          <a:prstGeom prst="rect">
+            <a:avLst/>
+          </a:prstGeom>
+          <a:noFill/>
+        </p:spPr>
+        <p:txBody>
+          <a:bodyPr wrap="square" rtlCol="0">
+            <a:spAutoFit/>
+          </a:bodyPr>
+          <a:lstStyle/>
+          <a:p>
+            <a:r>
+              <a:rPr lang="en-US" sz="1200" dirty="0" smtClean="0"/>
+              <a:t>fixed slope</a:t>
+            </a:r>
+            <a:endParaRPr lang="en-US" sz="1200" dirty="0"/>
+          </a:p>
+        </p:txBody>
+      </p:sp>
+      <p:cxnSp>
+        <p:nvCxnSpPr>
+          <p:cNvPr id="40" name="Straight Arrow Connector 39"/>
+          <p:cNvCxnSpPr/>
+          <p:nvPr/>
+        </p:nvCxnSpPr>
+        <p:spPr>
+          <a:xfrm>
+            <a:off x="2719616" y="3276600"/>
+            <a:ext cx="304800" cy="124599"/>
+          </a:xfrm>
+          <a:prstGeom prst="straightConnector1">
+            <a:avLst/>
+          </a:prstGeom>
+          <a:ln>
+            <a:solidFill>
+              <a:srgbClr val="000000"/>
+            </a:solidFill>
+            <a:tailEnd type="arrow"/>
+          </a:ln>
+        </p:spPr>
+        <p:style>
+          <a:lnRef idx="2">
+            <a:schemeClr val="accent1"/>
+          </a:lnRef>
+          <a:fillRef idx="0">
+            <a:schemeClr val="accent1"/>
+          </a:fillRef>
+          <a:effectRef idx="1">
+            <a:schemeClr val="accent1"/>
+          </a:effectRef>
+          <a:fontRef idx="minor">
+            <a:schemeClr val="tx1"/>
+          </a:fontRef>
+        </p:style>
+      </p:cxnSp>
+      <p:sp>
+        <p:nvSpPr>
+          <p:cNvPr id="42" name="TextBox 41"/>
+          <p:cNvSpPr txBox="1"/>
+          <p:nvPr/>
+        </p:nvSpPr>
+        <p:spPr>
+          <a:xfrm>
+            <a:off x="3133940" y="1932801"/>
+            <a:ext cx="1262076" cy="276999"/>
+          </a:xfrm>
+          <a:prstGeom prst="rect">
+            <a:avLst/>
+          </a:prstGeom>
+          <a:noFill/>
+        </p:spPr>
+        <p:txBody>
+          <a:bodyPr wrap="square" rtlCol="0">
+            <a:spAutoFit/>
+          </a:bodyPr>
+          <a:lstStyle/>
+          <a:p>
+            <a:r>
+              <a:rPr lang="en-US" sz="1200" dirty="0" smtClean="0"/>
+              <a:t>varying slope</a:t>
+            </a:r>
+            <a:endParaRPr lang="en-US" sz="1200" dirty="0"/>
+          </a:p>
+        </p:txBody>
+      </p:sp>
+      <p:cxnSp>
+        <p:nvCxnSpPr>
+          <p:cNvPr id="43" name="Straight Arrow Connector 42"/>
+          <p:cNvCxnSpPr/>
+          <p:nvPr/>
+        </p:nvCxnSpPr>
+        <p:spPr>
+          <a:xfrm>
+            <a:off x="4089605" y="2136513"/>
+            <a:ext cx="304800" cy="124599"/>
+          </a:xfrm>
+          <a:prstGeom prst="straightConnector1">
+            <a:avLst/>
+          </a:prstGeom>
+          <a:ln>
+            <a:solidFill>
+              <a:srgbClr val="000000"/>
+            </a:solidFill>
+            <a:tailEnd type="arrow"/>
+          </a:ln>
+        </p:spPr>
+        <p:style>
+          <a:lnRef idx="2">
+            <a:schemeClr val="accent1"/>
+          </a:lnRef>
+          <a:fillRef idx="0">
+            <a:schemeClr val="accent1"/>
+          </a:fillRef>
+          <a:effectRef idx="1">
+            <a:schemeClr val="accent1"/>
+          </a:effectRef>
+          <a:fontRef idx="minor">
+            <a:schemeClr val="tx1"/>
+          </a:fontRef>
+        </p:style>
+      </p:cxnSp>
+      <p:sp>
+        <p:nvSpPr>
+          <p:cNvPr id="44" name="TextBox 43"/>
+          <p:cNvSpPr txBox="1"/>
+          <p:nvPr/>
+        </p:nvSpPr>
+        <p:spPr>
+          <a:xfrm>
+            <a:off x="1485582" y="1600200"/>
+            <a:ext cx="3139033" cy="276999"/>
+          </a:xfrm>
+          <a:prstGeom prst="rect">
+            <a:avLst/>
+          </a:prstGeom>
+          <a:noFill/>
+        </p:spPr>
+        <p:txBody>
+          <a:bodyPr wrap="square" rtlCol="0">
+            <a:spAutoFit/>
+          </a:bodyPr>
+          <a:lstStyle/>
+          <a:p>
+            <a:r>
+              <a:rPr lang="en-US" sz="1200" dirty="0" smtClean="0"/>
+              <a:t>ice shelf, imposed by surface pressure</a:t>
+            </a:r>
+            <a:endParaRPr lang="en-US" sz="1200" dirty="0"/>
+          </a:p>
+        </p:txBody>
+      </p:sp>
+      <p:cxnSp>
+        <p:nvCxnSpPr>
+          <p:cNvPr id="47" name="Straight Arrow Connector 46"/>
+          <p:cNvCxnSpPr/>
+          <p:nvPr/>
+        </p:nvCxnSpPr>
+        <p:spPr>
+          <a:xfrm>
+            <a:off x="4015016" y="1503401"/>
+            <a:ext cx="895350" cy="0"/>
+          </a:xfrm>
+          <a:prstGeom prst="straightConnector1">
+            <a:avLst/>
+          </a:prstGeom>
+          <a:ln>
+            <a:solidFill>
+              <a:schemeClr val="tx1"/>
+            </a:solidFill>
+            <a:headEnd type="arrow"/>
+            <a:tailEnd type="arrow"/>
+          </a:ln>
+        </p:spPr>
+        <p:style>
+          <a:lnRef idx="2">
+            <a:schemeClr val="accent1"/>
+          </a:lnRef>
+          <a:fillRef idx="0">
+            <a:schemeClr val="accent1"/>
+          </a:fillRef>
+          <a:effectRef idx="1">
+            <a:schemeClr val="accent1"/>
+          </a:effectRef>
+          <a:fontRef idx="minor">
+            <a:schemeClr val="tx1"/>
+          </a:fontRef>
+        </p:style>
+      </p:cxnSp>
+      <p:sp>
+        <p:nvSpPr>
+          <p:cNvPr id="48" name="TextBox 47"/>
+          <p:cNvSpPr txBox="1"/>
+          <p:nvPr/>
+        </p:nvSpPr>
+        <p:spPr>
+          <a:xfrm>
+            <a:off x="3938816" y="1170801"/>
+            <a:ext cx="1225065" cy="276999"/>
+          </a:xfrm>
+          <a:prstGeom prst="rect">
+            <a:avLst/>
+          </a:prstGeom>
+          <a:noFill/>
+        </p:spPr>
+        <p:txBody>
+          <a:bodyPr wrap="none" rtlCol="0">
+            <a:spAutoFit/>
+          </a:bodyPr>
+          <a:lstStyle/>
+          <a:p>
+            <a:r>
+              <a:rPr lang="en-US" sz="1200" dirty="0" smtClean="0"/>
+              <a:t>B: 15 km (varies)</a:t>
+            </a:r>
+            <a:endParaRPr lang="en-US" sz="1200" dirty="0"/>
+          </a:p>
+        </p:txBody>
+      </p:sp>
+      <p:cxnSp>
+        <p:nvCxnSpPr>
+          <p:cNvPr id="51" name="Straight Arrow Connector 50"/>
+          <p:cNvCxnSpPr/>
+          <p:nvPr/>
+        </p:nvCxnSpPr>
+        <p:spPr>
+          <a:xfrm flipV="1">
+            <a:off x="429399" y="1600201"/>
+            <a:ext cx="0" cy="2823864"/>
+          </a:xfrm>
+          <a:prstGeom prst="straightConnector1">
+            <a:avLst/>
+          </a:prstGeom>
+          <a:ln>
+            <a:solidFill>
+              <a:schemeClr val="tx1"/>
+            </a:solidFill>
+            <a:headEnd type="arrow"/>
+            <a:tailEnd type="arrow"/>
+          </a:ln>
+        </p:spPr>
+        <p:style>
+          <a:lnRef idx="2">
+            <a:schemeClr val="accent1"/>
+          </a:lnRef>
+          <a:fillRef idx="0">
+            <a:schemeClr val="accent1"/>
+          </a:fillRef>
+          <a:effectRef idx="1">
+            <a:schemeClr val="accent1"/>
+          </a:effectRef>
+          <a:fontRef idx="minor">
+            <a:schemeClr val="tx1"/>
+          </a:fontRef>
+        </p:style>
+      </p:cxnSp>
+      <p:sp>
+        <p:nvSpPr>
+          <p:cNvPr id="53" name="TextBox 52"/>
+          <p:cNvSpPr txBox="1"/>
+          <p:nvPr/>
+        </p:nvSpPr>
+        <p:spPr>
+          <a:xfrm rot="16200000">
+            <a:off x="-36286" y="2779486"/>
+            <a:ext cx="654371" cy="276999"/>
+          </a:xfrm>
+          <a:prstGeom prst="rect">
+            <a:avLst/>
+          </a:prstGeom>
+          <a:noFill/>
+        </p:spPr>
+        <p:txBody>
+          <a:bodyPr wrap="none" rtlCol="0">
+            <a:spAutoFit/>
+          </a:bodyPr>
+          <a:lstStyle/>
+          <a:p>
+            <a:r>
+              <a:rPr lang="en-US" sz="1200" dirty="0" smtClean="0"/>
+              <a:t>1100 m</a:t>
+            </a:r>
+            <a:endParaRPr lang="en-US" sz="1200" dirty="0"/>
+          </a:p>
+        </p:txBody>
+      </p:sp>
+      <p:sp>
+        <p:nvSpPr>
+          <p:cNvPr id="34" name="TextBox 33"/>
+          <p:cNvSpPr txBox="1"/>
+          <p:nvPr/>
+        </p:nvSpPr>
+        <p:spPr>
+          <a:xfrm>
+            <a:off x="304800" y="1219200"/>
+            <a:ext cx="3139033" cy="307777"/>
+          </a:xfrm>
+          <a:prstGeom prst="rect">
+            <a:avLst/>
+          </a:prstGeom>
+          <a:noFill/>
+        </p:spPr>
+        <p:txBody>
+          <a:bodyPr wrap="square" rtlCol="0">
+            <a:spAutoFit/>
+          </a:bodyPr>
+          <a:lstStyle/>
+          <a:p>
+            <a:r>
+              <a:rPr lang="en-US" sz="1400" b="1" dirty="0" smtClean="0"/>
+              <a:t>Test 1: Quiescent cavity</a:t>
+            </a:r>
+            <a:endParaRPr lang="en-US" sz="1400" b="1" dirty="0"/>
+          </a:p>
+        </p:txBody>
+      </p:sp>
+      <p:sp>
+        <p:nvSpPr>
+          <p:cNvPr id="39" name="TextBox 38"/>
+          <p:cNvSpPr txBox="1"/>
+          <p:nvPr/>
+        </p:nvSpPr>
+        <p:spPr>
+          <a:xfrm>
+            <a:off x="1308492" y="4038600"/>
+            <a:ext cx="607859" cy="276999"/>
+          </a:xfrm>
+          <a:prstGeom prst="rect">
+            <a:avLst/>
+          </a:prstGeom>
+          <a:noFill/>
+        </p:spPr>
+        <p:txBody>
+          <a:bodyPr wrap="none" rtlCol="0">
+            <a:spAutoFit/>
+          </a:bodyPr>
+          <a:lstStyle/>
+          <a:p>
+            <a:r>
+              <a:rPr lang="en-US" sz="1200" dirty="0" smtClean="0"/>
+              <a:t>S=34.7</a:t>
+            </a:r>
+            <a:endParaRPr lang="en-US" sz="1200" dirty="0"/>
+          </a:p>
+        </p:txBody>
+      </p:sp>
+      <p:cxnSp>
+        <p:nvCxnSpPr>
+          <p:cNvPr id="41" name="Straight Arrow Connector 40"/>
+          <p:cNvCxnSpPr/>
+          <p:nvPr/>
+        </p:nvCxnSpPr>
+        <p:spPr>
+          <a:xfrm flipV="1">
+            <a:off x="429399" y="4724401"/>
+            <a:ext cx="0" cy="304799"/>
+          </a:xfrm>
+          <a:prstGeom prst="straightConnector1">
+            <a:avLst/>
+          </a:prstGeom>
+          <a:ln>
+            <a:solidFill>
+              <a:schemeClr val="tx1"/>
+            </a:solidFill>
+            <a:headEnd type="none"/>
+            <a:tailEnd type="arrow"/>
+          </a:ln>
+        </p:spPr>
+        <p:style>
+          <a:lnRef idx="2">
+            <a:schemeClr val="accent1"/>
+          </a:lnRef>
+          <a:fillRef idx="0">
+            <a:schemeClr val="accent1"/>
+          </a:fillRef>
+          <a:effectRef idx="1">
+            <a:schemeClr val="accent1"/>
+          </a:effectRef>
+          <a:fontRef idx="minor">
+            <a:schemeClr val="tx1"/>
+          </a:fontRef>
+        </p:style>
+      </p:cxnSp>
+      <p:cxnSp>
+        <p:nvCxnSpPr>
+          <p:cNvPr id="46" name="Straight Arrow Connector 45"/>
+          <p:cNvCxnSpPr/>
+          <p:nvPr/>
+        </p:nvCxnSpPr>
+        <p:spPr>
+          <a:xfrm rot="5400000" flipV="1">
+            <a:off x="581799" y="4876801"/>
+            <a:ext cx="0" cy="304799"/>
+          </a:xfrm>
+          <a:prstGeom prst="straightConnector1">
+            <a:avLst/>
+          </a:prstGeom>
+          <a:ln>
+            <a:solidFill>
+              <a:schemeClr val="tx1"/>
+            </a:solidFill>
+            <a:headEnd type="none"/>
+            <a:tailEnd type="arrow"/>
+          </a:ln>
+        </p:spPr>
+        <p:style>
+          <a:lnRef idx="2">
+            <a:schemeClr val="accent1"/>
+          </a:lnRef>
+          <a:fillRef idx="0">
+            <a:schemeClr val="accent1"/>
+          </a:fillRef>
+          <a:effectRef idx="1">
+            <a:schemeClr val="accent1"/>
+          </a:effectRef>
+          <a:fontRef idx="minor">
+            <a:schemeClr val="tx1"/>
+          </a:fontRef>
+        </p:style>
+      </p:cxnSp>
+      <p:sp>
+        <p:nvSpPr>
+          <p:cNvPr id="49" name="TextBox 48"/>
+          <p:cNvSpPr txBox="1"/>
+          <p:nvPr/>
+        </p:nvSpPr>
+        <p:spPr>
+          <a:xfrm>
+            <a:off x="657999" y="4828401"/>
+            <a:ext cx="317450" cy="276999"/>
+          </a:xfrm>
+          <a:prstGeom prst="rect">
+            <a:avLst/>
+          </a:prstGeom>
+          <a:noFill/>
+        </p:spPr>
+        <p:txBody>
+          <a:bodyPr wrap="none" rtlCol="0">
+            <a:spAutoFit/>
+          </a:bodyPr>
+          <a:lstStyle/>
+          <a:p>
+            <a:r>
+              <a:rPr lang="en-US" sz="1200" i="1" dirty="0" smtClean="0">
+                <a:latin typeface="Bookman Old Style"/>
+                <a:cs typeface="Bookman Old Style"/>
+              </a:rPr>
+              <a:t>y</a:t>
+            </a:r>
+            <a:endParaRPr lang="en-US" sz="1200" i="1" dirty="0">
+              <a:latin typeface="Bookman Old Style"/>
+              <a:cs typeface="Bookman Old Style"/>
+            </a:endParaRPr>
+          </a:p>
+        </p:txBody>
+      </p:sp>
+      <p:sp>
+        <p:nvSpPr>
+          <p:cNvPr id="50" name="TextBox 49"/>
+          <p:cNvSpPr txBox="1"/>
+          <p:nvPr/>
+        </p:nvSpPr>
+        <p:spPr>
+          <a:xfrm>
+            <a:off x="429399" y="4572000"/>
+            <a:ext cx="305127" cy="276999"/>
+          </a:xfrm>
+          <a:prstGeom prst="rect">
+            <a:avLst/>
+          </a:prstGeom>
+          <a:noFill/>
+        </p:spPr>
+        <p:txBody>
+          <a:bodyPr wrap="none" rtlCol="0">
+            <a:spAutoFit/>
+          </a:bodyPr>
+          <a:lstStyle/>
+          <a:p>
+            <a:r>
+              <a:rPr lang="en-US" sz="1200" i="1" dirty="0" smtClean="0">
+                <a:latin typeface="Bookman Old Style"/>
+                <a:cs typeface="Bookman Old Style"/>
+              </a:rPr>
+              <a:t>z</a:t>
+            </a:r>
+            <a:endParaRPr lang="en-US" sz="1200" i="1" dirty="0">
+              <a:latin typeface="Bookman Old Style"/>
+              <a:cs typeface="Bookman Old Style"/>
+            </a:endParaRPr>
+          </a:p>
+        </p:txBody>
+      </p:sp>
+      <p:sp>
+        <p:nvSpPr>
+          <p:cNvPr id="52" name="TextBox 51"/>
+          <p:cNvSpPr txBox="1"/>
+          <p:nvPr/>
+        </p:nvSpPr>
+        <p:spPr>
+          <a:xfrm>
+            <a:off x="4994974" y="2590800"/>
+            <a:ext cx="1767433" cy="461665"/>
+          </a:xfrm>
+          <a:prstGeom prst="rect">
+            <a:avLst/>
+          </a:prstGeom>
+          <a:noFill/>
+        </p:spPr>
+        <p:txBody>
+          <a:bodyPr wrap="square" rtlCol="0">
+            <a:spAutoFit/>
+          </a:bodyPr>
+          <a:lstStyle/>
+          <a:p>
+            <a:r>
+              <a:rPr lang="en-US" sz="1200" dirty="0" smtClean="0"/>
+              <a:t>MPAS-Ocean model </a:t>
+            </a:r>
+          </a:p>
+          <a:p>
+            <a:r>
+              <a:rPr lang="en-US" sz="1200" dirty="0" smtClean="0"/>
+              <a:t>22 layers, 50 m each </a:t>
+            </a:r>
+            <a:endParaRPr lang="en-US" sz="1200" dirty="0"/>
+          </a:p>
+        </p:txBody>
+      </p:sp>
+    </p:spTree>
+    <p:extLst>
+      <p:ext uri="{BB962C8B-B14F-4D97-AF65-F5344CB8AC3E}">
+        <p14:creationId xmlns:p14="http://schemas.microsoft.com/office/powerpoint/2010/main" val="388267886"/>
+      </p:ext>
+    </p:extLst>
+  </p:cSld>
+  <p:clrMapOvr>
+    <a:masterClrMapping/>
+  </p:clrMapOvr>
+</p:sld>
+</file>
+
+<file path=ppt/slides/slide3.xml><?xml version="1.0" encoding="utf-8"?>
+<p:sld xmlns:a="http://schemas.openxmlformats.org/drawingml/2006/main" xmlns:r="http://schemas.openxmlformats.org/officeDocument/2006/relationships" xmlns:p="http://schemas.openxmlformats.org/presentationml/2006/main">
+  <p:cSld>
+    <p:spTree>
+      <p:nvGrpSpPr>
+        <p:cNvPr id="1" name=""/>
+        <p:cNvGrpSpPr/>
+        <p:nvPr/>
+      </p:nvGrpSpPr>
+      <p:grpSpPr>
+        <a:xfrm>
+          <a:off x="0" y="0"/>
+          <a:ext cx="0" cy="0"/>
+          <a:chOff x="0" y="0"/>
+          <a:chExt cx="0" cy="0"/>
+        </a:xfrm>
+      </p:grpSpPr>
+      <p:sp>
+        <p:nvSpPr>
+          <p:cNvPr id="6" name="Rectangle 5"/>
+          <p:cNvSpPr/>
+          <p:nvPr/>
+        </p:nvSpPr>
+        <p:spPr>
+          <a:xfrm>
+            <a:off x="1271816" y="1612900"/>
+            <a:ext cx="6769100" cy="2743200"/>
+          </a:xfrm>
+          <a:prstGeom prst="rect">
+            <a:avLst/>
+          </a:prstGeom>
+          <a:gradFill>
+            <a:gsLst>
+              <a:gs pos="0">
+                <a:schemeClr val="accent1">
+                  <a:lumMod val="75000"/>
+                </a:schemeClr>
+              </a:gs>
+              <a:gs pos="100000">
+                <a:schemeClr val="accent1">
+                  <a:lumMod val="40000"/>
+                  <a:lumOff val="60000"/>
+                </a:schemeClr>
+              </a:gs>
+            </a:gsLst>
+            <a:lin ang="14640000" scaled="0"/>
+          </a:gradFill>
+        </p:spPr>
+        <p:style>
+          <a:lnRef idx="1">
+            <a:schemeClr val="accent1"/>
+          </a:lnRef>
+          <a:fillRef idx="3">
+            <a:schemeClr val="accent1"/>
+          </a:fillRef>
+          <a:effectRef idx="2">
+            <a:schemeClr val="accent1"/>
+          </a:effectRef>
+          <a:fontRef idx="minor">
+            <a:schemeClr val="lt1"/>
+          </a:fontRef>
+        </p:style>
+        <p:txBody>
+          <a:bodyPr rtlCol="0" anchor="ctr"/>
+          <a:lstStyle/>
+          <a:p>
+            <a:pPr algn="ctr"/>
+            <a:endParaRPr lang="en-US"/>
+          </a:p>
+        </p:txBody>
+      </p:sp>
+      <p:sp>
+        <p:nvSpPr>
+          <p:cNvPr id="7" name="Freeform 6"/>
+          <p:cNvSpPr/>
+          <p:nvPr/>
+        </p:nvSpPr>
+        <p:spPr>
+          <a:xfrm>
+            <a:off x="1271816" y="1600200"/>
+            <a:ext cx="3638550" cy="2362200"/>
+          </a:xfrm>
+          <a:custGeom>
+            <a:avLst/>
+            <a:gdLst>
+              <a:gd name="connsiteX0" fmla="*/ 0 w 3498850"/>
+              <a:gd name="connsiteY0" fmla="*/ 0 h 2362200"/>
+              <a:gd name="connsiteX1" fmla="*/ 12700 w 3498850"/>
+              <a:gd name="connsiteY1" fmla="*/ 2355850 h 2362200"/>
+              <a:gd name="connsiteX2" fmla="*/ 793750 w 3498850"/>
+              <a:gd name="connsiteY2" fmla="*/ 2362200 h 2362200"/>
+              <a:gd name="connsiteX3" fmla="*/ 2641600 w 3498850"/>
+              <a:gd name="connsiteY3" fmla="*/ 1206500 h 2362200"/>
+              <a:gd name="connsiteX4" fmla="*/ 3498850 w 3498850"/>
+              <a:gd name="connsiteY4" fmla="*/ 12700 h 2362200"/>
+              <a:gd name="connsiteX5" fmla="*/ 0 w 3498850"/>
+              <a:gd name="connsiteY5" fmla="*/ 0 h 2362200"/>
+            </a:gdLst>
+            <a:ahLst/>
+            <a:cxnLst>
+              <a:cxn ang="0">
+                <a:pos x="connsiteX0" y="connsiteY0"/>
+              </a:cxn>
+              <a:cxn ang="0">
+                <a:pos x="connsiteX1" y="connsiteY1"/>
+              </a:cxn>
+              <a:cxn ang="0">
+                <a:pos x="connsiteX2" y="connsiteY2"/>
+              </a:cxn>
+              <a:cxn ang="0">
+                <a:pos x="connsiteX3" y="connsiteY3"/>
+              </a:cxn>
+              <a:cxn ang="0">
+                <a:pos x="connsiteX4" y="connsiteY4"/>
+              </a:cxn>
+              <a:cxn ang="0">
+                <a:pos x="connsiteX5" y="connsiteY5"/>
+              </a:cxn>
+            </a:cxnLst>
+            <a:rect l="l" t="t" r="r" b="b"/>
+            <a:pathLst>
+              <a:path w="3498850" h="2362200">
+                <a:moveTo>
+                  <a:pt x="0" y="0"/>
+                </a:moveTo>
+                <a:cubicBezTo>
+                  <a:pt x="4233" y="785283"/>
+                  <a:pt x="8467" y="1570567"/>
+                  <a:pt x="12700" y="2355850"/>
+                </a:cubicBezTo>
+                <a:lnTo>
+                  <a:pt x="793750" y="2362200"/>
+                </a:lnTo>
+                <a:lnTo>
+                  <a:pt x="2641600" y="1206500"/>
+                </a:lnTo>
+                <a:lnTo>
+                  <a:pt x="3498850" y="12700"/>
+                </a:lnTo>
+                <a:lnTo>
+                  <a:pt x="0" y="0"/>
+                </a:lnTo>
+                <a:close/>
+              </a:path>
+            </a:pathLst>
+          </a:custGeom>
+          <a:gradFill>
+            <a:gsLst>
+              <a:gs pos="0">
+                <a:schemeClr val="bg1">
+                  <a:lumMod val="75000"/>
+                </a:schemeClr>
+              </a:gs>
+              <a:gs pos="100000">
+                <a:schemeClr val="bg1">
+                  <a:lumMod val="95000"/>
+                </a:schemeClr>
+              </a:gs>
+            </a:gsLst>
+          </a:gradFill>
+        </p:spPr>
+        <p:style>
+          <a:lnRef idx="1">
+            <a:schemeClr val="accent1"/>
+          </a:lnRef>
+          <a:fillRef idx="3">
+            <a:schemeClr val="accent1"/>
+          </a:fillRef>
+          <a:effectRef idx="2">
+            <a:schemeClr val="accent1"/>
+          </a:effectRef>
+          <a:fontRef idx="minor">
+            <a:schemeClr val="lt1"/>
+          </a:fontRef>
+        </p:style>
+        <p:txBody>
+          <a:bodyPr rtlCol="0" anchor="ctr"/>
+          <a:lstStyle/>
+          <a:p>
+            <a:pPr algn="ctr"/>
+            <a:endParaRPr lang="en-US"/>
+          </a:p>
+        </p:txBody>
+      </p:sp>
+      <p:cxnSp>
+        <p:nvCxnSpPr>
+          <p:cNvPr id="9" name="Straight Arrow Connector 8"/>
+          <p:cNvCxnSpPr/>
+          <p:nvPr/>
+        </p:nvCxnSpPr>
+        <p:spPr>
+          <a:xfrm>
+            <a:off x="1285023" y="4718050"/>
+            <a:ext cx="812235" cy="6350"/>
+          </a:xfrm>
+          <a:prstGeom prst="straightConnector1">
+            <a:avLst/>
+          </a:prstGeom>
+          <a:ln>
+            <a:solidFill>
+              <a:schemeClr val="tx1"/>
+            </a:solidFill>
+            <a:headEnd type="arrow"/>
+            <a:tailEnd type="arrow"/>
+          </a:ln>
+        </p:spPr>
+        <p:style>
+          <a:lnRef idx="2">
+            <a:schemeClr val="accent1"/>
+          </a:lnRef>
+          <a:fillRef idx="0">
+            <a:schemeClr val="accent1"/>
+          </a:fillRef>
+          <a:effectRef idx="1">
+            <a:schemeClr val="accent1"/>
+          </a:effectRef>
+          <a:fontRef idx="minor">
+            <a:schemeClr val="tx1"/>
+          </a:fontRef>
+        </p:style>
+      </p:cxnSp>
+      <p:cxnSp>
+        <p:nvCxnSpPr>
+          <p:cNvPr id="11" name="Straight Arrow Connector 10"/>
+          <p:cNvCxnSpPr/>
+          <p:nvPr/>
+        </p:nvCxnSpPr>
+        <p:spPr>
+          <a:xfrm>
+            <a:off x="2097258" y="4724400"/>
+            <a:ext cx="1917758" cy="0"/>
+          </a:xfrm>
+          <a:prstGeom prst="straightConnector1">
+            <a:avLst/>
+          </a:prstGeom>
+          <a:ln>
+            <a:solidFill>
+              <a:schemeClr val="tx1"/>
+            </a:solidFill>
+            <a:headEnd type="arrow"/>
+            <a:tailEnd type="arrow"/>
+          </a:ln>
+        </p:spPr>
+        <p:style>
+          <a:lnRef idx="2">
+            <a:schemeClr val="accent1"/>
+          </a:lnRef>
+          <a:fillRef idx="0">
+            <a:schemeClr val="accent1"/>
+          </a:fillRef>
+          <a:effectRef idx="1">
+            <a:schemeClr val="accent1"/>
+          </a:effectRef>
+          <a:fontRef idx="minor">
+            <a:schemeClr val="tx1"/>
+          </a:fontRef>
+        </p:style>
+      </p:cxnSp>
+      <p:cxnSp>
+        <p:nvCxnSpPr>
+          <p:cNvPr id="13" name="Straight Arrow Connector 12"/>
+          <p:cNvCxnSpPr/>
+          <p:nvPr/>
+        </p:nvCxnSpPr>
+        <p:spPr>
+          <a:xfrm>
+            <a:off x="4015016" y="4724400"/>
+            <a:ext cx="4025900" cy="0"/>
+          </a:xfrm>
+          <a:prstGeom prst="straightConnector1">
+            <a:avLst/>
+          </a:prstGeom>
+          <a:ln>
+            <a:solidFill>
+              <a:schemeClr val="tx1"/>
+            </a:solidFill>
+            <a:headEnd type="arrow"/>
+            <a:tailEnd type="arrow"/>
+          </a:ln>
+        </p:spPr>
+        <p:style>
+          <a:lnRef idx="2">
+            <a:schemeClr val="accent1"/>
+          </a:lnRef>
+          <a:fillRef idx="0">
+            <a:schemeClr val="accent1"/>
+          </a:fillRef>
+          <a:effectRef idx="1">
+            <a:schemeClr val="accent1"/>
+          </a:effectRef>
+          <a:fontRef idx="minor">
+            <a:schemeClr val="tx1"/>
+          </a:fontRef>
+        </p:style>
+      </p:cxnSp>
+      <p:sp>
+        <p:nvSpPr>
+          <p:cNvPr id="16" name="TextBox 15"/>
+          <p:cNvSpPr txBox="1"/>
+          <p:nvPr/>
+        </p:nvSpPr>
+        <p:spPr>
+          <a:xfrm>
+            <a:off x="1348016" y="4419600"/>
+            <a:ext cx="568335" cy="276999"/>
+          </a:xfrm>
+          <a:prstGeom prst="rect">
+            <a:avLst/>
+          </a:prstGeom>
+          <a:noFill/>
+        </p:spPr>
+        <p:txBody>
+          <a:bodyPr wrap="none" rtlCol="0">
+            <a:spAutoFit/>
+          </a:bodyPr>
+          <a:lstStyle/>
+          <a:p>
+            <a:r>
+              <a:rPr lang="en-US" sz="1200" dirty="0" smtClean="0"/>
+              <a:t>15 km</a:t>
+            </a:r>
+            <a:endParaRPr lang="en-US" sz="1200" dirty="0"/>
+          </a:p>
+        </p:txBody>
+      </p:sp>
+      <p:sp>
+        <p:nvSpPr>
+          <p:cNvPr id="17" name="TextBox 16"/>
+          <p:cNvSpPr txBox="1"/>
+          <p:nvPr/>
+        </p:nvSpPr>
+        <p:spPr>
+          <a:xfrm>
+            <a:off x="5580281" y="4419600"/>
+            <a:ext cx="646331" cy="276999"/>
+          </a:xfrm>
+          <a:prstGeom prst="rect">
+            <a:avLst/>
+          </a:prstGeom>
+          <a:noFill/>
+        </p:spPr>
+        <p:txBody>
+          <a:bodyPr wrap="none" rtlCol="0">
+            <a:spAutoFit/>
+          </a:bodyPr>
+          <a:lstStyle/>
+          <a:p>
+            <a:r>
+              <a:rPr lang="en-US" sz="1200" dirty="0" smtClean="0"/>
+              <a:t>155 km</a:t>
+            </a:r>
+            <a:endParaRPr lang="en-US" sz="1200" dirty="0"/>
+          </a:p>
+        </p:txBody>
+      </p:sp>
+      <p:sp>
+        <p:nvSpPr>
+          <p:cNvPr id="18" name="TextBox 17"/>
+          <p:cNvSpPr txBox="1"/>
+          <p:nvPr/>
+        </p:nvSpPr>
+        <p:spPr>
+          <a:xfrm>
+            <a:off x="2795816" y="4419600"/>
+            <a:ext cx="568335" cy="276999"/>
+          </a:xfrm>
+          <a:prstGeom prst="rect">
+            <a:avLst/>
+          </a:prstGeom>
+          <a:noFill/>
+        </p:spPr>
+        <p:txBody>
+          <a:bodyPr wrap="none" rtlCol="0">
+            <a:spAutoFit/>
+          </a:bodyPr>
+          <a:lstStyle/>
+          <a:p>
+            <a:r>
+              <a:rPr lang="en-US" sz="1200" dirty="0" smtClean="0"/>
+              <a:t>30 km</a:t>
+            </a:r>
+            <a:endParaRPr lang="en-US" sz="1200" dirty="0"/>
+          </a:p>
+        </p:txBody>
+      </p:sp>
+      <p:cxnSp>
+        <p:nvCxnSpPr>
+          <p:cNvPr id="19" name="Straight Arrow Connector 18"/>
+          <p:cNvCxnSpPr/>
+          <p:nvPr/>
+        </p:nvCxnSpPr>
+        <p:spPr>
+          <a:xfrm>
+            <a:off x="1285023" y="5029200"/>
+            <a:ext cx="6755893" cy="0"/>
+          </a:xfrm>
+          <a:prstGeom prst="straightConnector1">
+            <a:avLst/>
+          </a:prstGeom>
+          <a:ln>
+            <a:solidFill>
+              <a:schemeClr val="tx1"/>
+            </a:solidFill>
+            <a:headEnd type="arrow"/>
+            <a:tailEnd type="arrow"/>
+          </a:ln>
+        </p:spPr>
+        <p:style>
+          <a:lnRef idx="2">
+            <a:schemeClr val="accent1"/>
+          </a:lnRef>
+          <a:fillRef idx="0">
+            <a:schemeClr val="accent1"/>
+          </a:fillRef>
+          <a:effectRef idx="1">
+            <a:schemeClr val="accent1"/>
+          </a:effectRef>
+          <a:fontRef idx="minor">
+            <a:schemeClr val="tx1"/>
+          </a:fontRef>
+        </p:style>
+      </p:cxnSp>
+      <p:sp>
+        <p:nvSpPr>
+          <p:cNvPr id="21" name="TextBox 20"/>
+          <p:cNvSpPr txBox="1"/>
+          <p:nvPr/>
+        </p:nvSpPr>
+        <p:spPr>
+          <a:xfrm>
+            <a:off x="3786416" y="4752201"/>
+            <a:ext cx="646331" cy="276999"/>
+          </a:xfrm>
+          <a:prstGeom prst="rect">
+            <a:avLst/>
+          </a:prstGeom>
+          <a:noFill/>
+        </p:spPr>
+        <p:txBody>
+          <a:bodyPr wrap="none" rtlCol="0">
+            <a:spAutoFit/>
+          </a:bodyPr>
+          <a:lstStyle/>
+          <a:p>
+            <a:r>
+              <a:rPr lang="en-US" sz="1200" dirty="0" smtClean="0"/>
+              <a:t>200 km</a:t>
+            </a:r>
+            <a:endParaRPr lang="en-US" sz="1200" dirty="0"/>
+          </a:p>
+        </p:txBody>
+      </p:sp>
+      <p:cxnSp>
+        <p:nvCxnSpPr>
+          <p:cNvPr id="22" name="Straight Arrow Connector 21"/>
+          <p:cNvCxnSpPr/>
+          <p:nvPr/>
+        </p:nvCxnSpPr>
+        <p:spPr>
+          <a:xfrm flipV="1">
+            <a:off x="1104116" y="3962400"/>
+            <a:ext cx="0" cy="406400"/>
+          </a:xfrm>
+          <a:prstGeom prst="straightConnector1">
+            <a:avLst/>
+          </a:prstGeom>
+          <a:ln>
+            <a:solidFill>
+              <a:schemeClr val="tx1"/>
+            </a:solidFill>
+            <a:headEnd type="arrow"/>
+            <a:tailEnd type="arrow"/>
+          </a:ln>
+        </p:spPr>
+        <p:style>
+          <a:lnRef idx="2">
+            <a:schemeClr val="accent1"/>
+          </a:lnRef>
+          <a:fillRef idx="0">
+            <a:schemeClr val="accent1"/>
+          </a:fillRef>
+          <a:effectRef idx="1">
+            <a:schemeClr val="accent1"/>
+          </a:effectRef>
+          <a:fontRef idx="minor">
+            <a:schemeClr val="tx1"/>
+          </a:fontRef>
+        </p:style>
+      </p:cxnSp>
+      <p:sp>
+        <p:nvSpPr>
+          <p:cNvPr id="23" name="TextBox 22"/>
+          <p:cNvSpPr txBox="1"/>
+          <p:nvPr/>
+        </p:nvSpPr>
+        <p:spPr>
+          <a:xfrm>
+            <a:off x="369892" y="3962400"/>
+            <a:ext cx="749524" cy="461665"/>
+          </a:xfrm>
+          <a:prstGeom prst="rect">
+            <a:avLst/>
+          </a:prstGeom>
+          <a:noFill/>
+        </p:spPr>
+        <p:txBody>
+          <a:bodyPr wrap="none" rtlCol="0">
+            <a:spAutoFit/>
+          </a:bodyPr>
+          <a:lstStyle/>
+          <a:p>
+            <a:pPr algn="r"/>
+            <a:r>
+              <a:rPr lang="en-US" sz="1200" dirty="0" smtClean="0"/>
+              <a:t>A: 100 m</a:t>
+            </a:r>
+          </a:p>
+          <a:p>
+            <a:pPr algn="r"/>
+            <a:r>
+              <a:rPr lang="en-US" sz="1200" dirty="0" smtClean="0"/>
+              <a:t>(varies)</a:t>
+            </a:r>
+            <a:endParaRPr lang="en-US" sz="1200" dirty="0"/>
+          </a:p>
+        </p:txBody>
+      </p:sp>
+      <p:cxnSp>
+        <p:nvCxnSpPr>
+          <p:cNvPr id="25" name="Straight Arrow Connector 24"/>
+          <p:cNvCxnSpPr/>
+          <p:nvPr/>
+        </p:nvCxnSpPr>
+        <p:spPr>
+          <a:xfrm flipV="1">
+            <a:off x="1097766" y="2819399"/>
+            <a:ext cx="0" cy="1143001"/>
+          </a:xfrm>
+          <a:prstGeom prst="straightConnector1">
+            <a:avLst/>
+          </a:prstGeom>
+          <a:ln>
+            <a:solidFill>
+              <a:schemeClr val="tx1"/>
+            </a:solidFill>
+            <a:headEnd type="arrow"/>
+            <a:tailEnd type="arrow"/>
+          </a:ln>
+        </p:spPr>
+        <p:style>
+          <a:lnRef idx="2">
+            <a:schemeClr val="accent1"/>
+          </a:lnRef>
+          <a:fillRef idx="0">
+            <a:schemeClr val="accent1"/>
+          </a:fillRef>
+          <a:effectRef idx="1">
+            <a:schemeClr val="accent1"/>
+          </a:effectRef>
+          <a:fontRef idx="minor">
+            <a:schemeClr val="tx1"/>
+          </a:fontRef>
+        </p:style>
+      </p:cxnSp>
+      <p:cxnSp>
+        <p:nvCxnSpPr>
+          <p:cNvPr id="28" name="Straight Arrow Connector 27"/>
+          <p:cNvCxnSpPr/>
+          <p:nvPr/>
+        </p:nvCxnSpPr>
+        <p:spPr>
+          <a:xfrm flipV="1">
+            <a:off x="1097766" y="1600199"/>
+            <a:ext cx="0" cy="1219201"/>
+          </a:xfrm>
+          <a:prstGeom prst="straightConnector1">
+            <a:avLst/>
+          </a:prstGeom>
+          <a:ln>
+            <a:solidFill>
+              <a:schemeClr val="tx1"/>
+            </a:solidFill>
+            <a:headEnd type="arrow"/>
+            <a:tailEnd type="arrow"/>
+          </a:ln>
+        </p:spPr>
+        <p:style>
+          <a:lnRef idx="2">
+            <a:schemeClr val="accent1"/>
+          </a:lnRef>
+          <a:fillRef idx="0">
+            <a:schemeClr val="accent1"/>
+          </a:fillRef>
+          <a:effectRef idx="1">
+            <a:schemeClr val="accent1"/>
+          </a:effectRef>
+          <a:fontRef idx="minor">
+            <a:schemeClr val="tx1"/>
+          </a:fontRef>
+        </p:style>
+      </p:cxnSp>
+      <p:sp>
+        <p:nvSpPr>
+          <p:cNvPr id="30" name="TextBox 29"/>
+          <p:cNvSpPr txBox="1"/>
+          <p:nvPr/>
+        </p:nvSpPr>
+        <p:spPr>
+          <a:xfrm>
+            <a:off x="509816" y="3124200"/>
+            <a:ext cx="576375" cy="276999"/>
+          </a:xfrm>
+          <a:prstGeom prst="rect">
+            <a:avLst/>
+          </a:prstGeom>
+          <a:noFill/>
+        </p:spPr>
+        <p:txBody>
+          <a:bodyPr wrap="none" rtlCol="0">
+            <a:spAutoFit/>
+          </a:bodyPr>
+          <a:lstStyle/>
+          <a:p>
+            <a:r>
+              <a:rPr lang="en-US" sz="1200" dirty="0" smtClean="0"/>
+              <a:t>500 m</a:t>
+            </a:r>
+            <a:endParaRPr lang="en-US" sz="1200" dirty="0"/>
+          </a:p>
+        </p:txBody>
+      </p:sp>
+      <p:sp>
+        <p:nvSpPr>
+          <p:cNvPr id="31" name="TextBox 30"/>
+          <p:cNvSpPr txBox="1"/>
+          <p:nvPr/>
+        </p:nvSpPr>
+        <p:spPr>
+          <a:xfrm>
+            <a:off x="466097" y="1981200"/>
+            <a:ext cx="653319" cy="461665"/>
+          </a:xfrm>
+          <a:prstGeom prst="rect">
+            <a:avLst/>
+          </a:prstGeom>
+          <a:noFill/>
+        </p:spPr>
+        <p:txBody>
+          <a:bodyPr wrap="none" rtlCol="0">
+            <a:spAutoFit/>
+          </a:bodyPr>
+          <a:lstStyle/>
+          <a:p>
+            <a:pPr algn="r"/>
+            <a:r>
+              <a:rPr lang="en-US" sz="1200" dirty="0" smtClean="0"/>
+              <a:t>500 m</a:t>
+            </a:r>
+          </a:p>
+          <a:p>
+            <a:pPr algn="r"/>
+            <a:r>
+              <a:rPr lang="en-US" sz="1200" dirty="0" smtClean="0"/>
+              <a:t>(varies)</a:t>
+            </a:r>
+            <a:endParaRPr lang="en-US" sz="1200" dirty="0"/>
+          </a:p>
+        </p:txBody>
+      </p:sp>
+      <p:sp>
+        <p:nvSpPr>
+          <p:cNvPr id="35" name="TextBox 34"/>
+          <p:cNvSpPr txBox="1"/>
+          <p:nvPr/>
+        </p:nvSpPr>
+        <p:spPr>
+          <a:xfrm>
+            <a:off x="8062523" y="2209800"/>
+            <a:ext cx="983112" cy="1384995"/>
+          </a:xfrm>
+          <a:prstGeom prst="rect">
+            <a:avLst/>
+          </a:prstGeom>
+          <a:noFill/>
+        </p:spPr>
+        <p:txBody>
+          <a:bodyPr wrap="none" rtlCol="0">
+            <a:spAutoFit/>
+          </a:bodyPr>
+          <a:lstStyle/>
+          <a:p>
+            <a:r>
+              <a:rPr lang="en-US" sz="1200" dirty="0" smtClean="0"/>
+              <a:t>linear</a:t>
+            </a:r>
+          </a:p>
+          <a:p>
+            <a:r>
+              <a:rPr lang="en-US" sz="1200" dirty="0" smtClean="0"/>
+              <a:t>stratification</a:t>
+            </a:r>
+          </a:p>
+          <a:p>
+            <a:r>
+              <a:rPr lang="en-US" sz="1200" dirty="0" smtClean="0"/>
+              <a:t>in salinity,</a:t>
+            </a:r>
+          </a:p>
+          <a:p>
+            <a:r>
+              <a:rPr lang="en-US" sz="1200" dirty="0" smtClean="0"/>
+              <a:t>both hor. </a:t>
+            </a:r>
+            <a:endParaRPr lang="en-US" sz="1200" dirty="0"/>
+          </a:p>
+          <a:p>
+            <a:r>
+              <a:rPr lang="en-US" sz="1200" dirty="0" smtClean="0"/>
+              <a:t>and vert.,</a:t>
+            </a:r>
+          </a:p>
+          <a:p>
+            <a:r>
+              <a:rPr lang="en-US" sz="1200" dirty="0" smtClean="0"/>
+              <a:t>constant</a:t>
+            </a:r>
+          </a:p>
+          <a:p>
+            <a:r>
+              <a:rPr lang="en-US" sz="1200" dirty="0" smtClean="0"/>
+              <a:t>temperature</a:t>
+            </a:r>
+            <a:endParaRPr lang="en-US" sz="1200" dirty="0"/>
+          </a:p>
+        </p:txBody>
+      </p:sp>
+      <p:sp>
+        <p:nvSpPr>
+          <p:cNvPr id="36" name="TextBox 35"/>
+          <p:cNvSpPr txBox="1"/>
+          <p:nvPr/>
+        </p:nvSpPr>
+        <p:spPr>
+          <a:xfrm>
+            <a:off x="8054146" y="1551801"/>
+            <a:ext cx="604853" cy="276999"/>
+          </a:xfrm>
+          <a:prstGeom prst="rect">
+            <a:avLst/>
+          </a:prstGeom>
+          <a:noFill/>
+        </p:spPr>
+        <p:txBody>
+          <a:bodyPr wrap="none" rtlCol="0">
+            <a:spAutoFit/>
+          </a:bodyPr>
+          <a:lstStyle/>
+          <a:p>
+            <a:r>
+              <a:rPr lang="en-US" sz="1200" dirty="0" smtClean="0"/>
+              <a:t>S=34.5</a:t>
+            </a:r>
+            <a:endParaRPr lang="en-US" sz="1200" dirty="0"/>
+          </a:p>
+        </p:txBody>
+      </p:sp>
+      <p:sp>
+        <p:nvSpPr>
+          <p:cNvPr id="37" name="TextBox 36"/>
+          <p:cNvSpPr txBox="1"/>
+          <p:nvPr/>
+        </p:nvSpPr>
+        <p:spPr>
+          <a:xfrm>
+            <a:off x="8051140" y="4114800"/>
+            <a:ext cx="607859" cy="276999"/>
+          </a:xfrm>
+          <a:prstGeom prst="rect">
+            <a:avLst/>
+          </a:prstGeom>
+          <a:noFill/>
+        </p:spPr>
+        <p:txBody>
+          <a:bodyPr wrap="none" rtlCol="0">
+            <a:spAutoFit/>
+          </a:bodyPr>
+          <a:lstStyle/>
+          <a:p>
+            <a:r>
+              <a:rPr lang="en-US" sz="1200" dirty="0" smtClean="0"/>
+              <a:t>S=34.7</a:t>
+            </a:r>
+            <a:endParaRPr lang="en-US" sz="1200" dirty="0"/>
+          </a:p>
+        </p:txBody>
+      </p:sp>
+      <p:sp>
+        <p:nvSpPr>
+          <p:cNvPr id="38" name="TextBox 37"/>
+          <p:cNvSpPr txBox="1"/>
+          <p:nvPr/>
+        </p:nvSpPr>
+        <p:spPr>
+          <a:xfrm>
+            <a:off x="1916351" y="3121287"/>
+            <a:ext cx="1262076" cy="276999"/>
+          </a:xfrm>
+          <a:prstGeom prst="rect">
+            <a:avLst/>
+          </a:prstGeom>
+          <a:noFill/>
+        </p:spPr>
+        <p:txBody>
+          <a:bodyPr wrap="square" rtlCol="0">
+            <a:spAutoFit/>
+          </a:bodyPr>
+          <a:lstStyle/>
+          <a:p>
+            <a:r>
+              <a:rPr lang="en-US" sz="1200" dirty="0" smtClean="0"/>
+              <a:t>fixed slope</a:t>
+            </a:r>
+            <a:endParaRPr lang="en-US" sz="1200" dirty="0"/>
+          </a:p>
+        </p:txBody>
+      </p:sp>
+      <p:cxnSp>
+        <p:nvCxnSpPr>
+          <p:cNvPr id="40" name="Straight Arrow Connector 39"/>
+          <p:cNvCxnSpPr/>
+          <p:nvPr/>
+        </p:nvCxnSpPr>
+        <p:spPr>
+          <a:xfrm>
+            <a:off x="2719616" y="3276600"/>
+            <a:ext cx="304800" cy="124599"/>
+          </a:xfrm>
+          <a:prstGeom prst="straightConnector1">
+            <a:avLst/>
+          </a:prstGeom>
+          <a:ln>
+            <a:solidFill>
+              <a:srgbClr val="000000"/>
+            </a:solidFill>
+            <a:tailEnd type="arrow"/>
+          </a:ln>
+        </p:spPr>
+        <p:style>
+          <a:lnRef idx="2">
+            <a:schemeClr val="accent1"/>
+          </a:lnRef>
+          <a:fillRef idx="0">
+            <a:schemeClr val="accent1"/>
+          </a:fillRef>
+          <a:effectRef idx="1">
+            <a:schemeClr val="accent1"/>
+          </a:effectRef>
+          <a:fontRef idx="minor">
+            <a:schemeClr val="tx1"/>
+          </a:fontRef>
+        </p:style>
+      </p:cxnSp>
+      <p:sp>
+        <p:nvSpPr>
+          <p:cNvPr id="42" name="TextBox 41"/>
+          <p:cNvSpPr txBox="1"/>
+          <p:nvPr/>
+        </p:nvSpPr>
+        <p:spPr>
+          <a:xfrm>
+            <a:off x="3133940" y="1932801"/>
+            <a:ext cx="1262076" cy="276999"/>
+          </a:xfrm>
+          <a:prstGeom prst="rect">
+            <a:avLst/>
+          </a:prstGeom>
+          <a:noFill/>
+        </p:spPr>
+        <p:txBody>
+          <a:bodyPr wrap="square" rtlCol="0">
+            <a:spAutoFit/>
+          </a:bodyPr>
+          <a:lstStyle/>
+          <a:p>
+            <a:r>
+              <a:rPr lang="en-US" sz="1200" dirty="0" smtClean="0"/>
+              <a:t>varying slope</a:t>
+            </a:r>
+            <a:endParaRPr lang="en-US" sz="1200" dirty="0"/>
+          </a:p>
+        </p:txBody>
+      </p:sp>
+      <p:cxnSp>
+        <p:nvCxnSpPr>
+          <p:cNvPr id="43" name="Straight Arrow Connector 42"/>
+          <p:cNvCxnSpPr/>
+          <p:nvPr/>
+        </p:nvCxnSpPr>
+        <p:spPr>
+          <a:xfrm>
+            <a:off x="4089605" y="2136513"/>
+            <a:ext cx="304800" cy="124599"/>
+          </a:xfrm>
+          <a:prstGeom prst="straightConnector1">
+            <a:avLst/>
+          </a:prstGeom>
+          <a:ln>
+            <a:solidFill>
+              <a:srgbClr val="000000"/>
+            </a:solidFill>
+            <a:tailEnd type="arrow"/>
+          </a:ln>
+        </p:spPr>
+        <p:style>
+          <a:lnRef idx="2">
+            <a:schemeClr val="accent1"/>
+          </a:lnRef>
+          <a:fillRef idx="0">
+            <a:schemeClr val="accent1"/>
+          </a:fillRef>
+          <a:effectRef idx="1">
+            <a:schemeClr val="accent1"/>
+          </a:effectRef>
+          <a:fontRef idx="minor">
+            <a:schemeClr val="tx1"/>
+          </a:fontRef>
+        </p:style>
+      </p:cxnSp>
+      <p:sp>
+        <p:nvSpPr>
+          <p:cNvPr id="44" name="TextBox 43"/>
+          <p:cNvSpPr txBox="1"/>
+          <p:nvPr/>
+        </p:nvSpPr>
+        <p:spPr>
+          <a:xfrm>
+            <a:off x="1485582" y="1600200"/>
+            <a:ext cx="3139033" cy="276999"/>
+          </a:xfrm>
+          <a:prstGeom prst="rect">
+            <a:avLst/>
+          </a:prstGeom>
+          <a:noFill/>
+        </p:spPr>
+        <p:txBody>
+          <a:bodyPr wrap="square" rtlCol="0">
+            <a:spAutoFit/>
+          </a:bodyPr>
+          <a:lstStyle/>
+          <a:p>
+            <a:r>
+              <a:rPr lang="en-US" sz="1200" dirty="0" smtClean="0"/>
+              <a:t>ice shelf, imposed by surface pressure</a:t>
+            </a:r>
+            <a:endParaRPr lang="en-US" sz="1200" dirty="0"/>
+          </a:p>
+        </p:txBody>
+      </p:sp>
+      <p:sp>
+        <p:nvSpPr>
+          <p:cNvPr id="45" name="TextBox 44"/>
+          <p:cNvSpPr txBox="1"/>
+          <p:nvPr/>
+        </p:nvSpPr>
+        <p:spPr>
+          <a:xfrm>
+            <a:off x="4994974" y="2590800"/>
+            <a:ext cx="1767433" cy="461665"/>
+          </a:xfrm>
+          <a:prstGeom prst="rect">
+            <a:avLst/>
+          </a:prstGeom>
+          <a:noFill/>
+        </p:spPr>
+        <p:txBody>
+          <a:bodyPr wrap="square" rtlCol="0">
+            <a:spAutoFit/>
+          </a:bodyPr>
+          <a:lstStyle/>
+          <a:p>
+            <a:r>
+              <a:rPr lang="en-US" sz="1200" dirty="0" smtClean="0"/>
+              <a:t>MPAS-Ocean model </a:t>
+            </a:r>
+          </a:p>
+          <a:p>
+            <a:r>
+              <a:rPr lang="en-US" sz="1200" dirty="0" smtClean="0"/>
+              <a:t>22 layers, 50 m each </a:t>
+            </a:r>
+            <a:endParaRPr lang="en-US" sz="1200" dirty="0"/>
+          </a:p>
+        </p:txBody>
+      </p:sp>
+      <p:cxnSp>
+        <p:nvCxnSpPr>
+          <p:cNvPr id="47" name="Straight Arrow Connector 46"/>
+          <p:cNvCxnSpPr/>
+          <p:nvPr/>
+        </p:nvCxnSpPr>
+        <p:spPr>
+          <a:xfrm>
+            <a:off x="4015016" y="1503401"/>
+            <a:ext cx="895350" cy="0"/>
+          </a:xfrm>
+          <a:prstGeom prst="straightConnector1">
+            <a:avLst/>
+          </a:prstGeom>
+          <a:ln>
+            <a:solidFill>
+              <a:schemeClr val="tx1"/>
+            </a:solidFill>
+            <a:headEnd type="arrow"/>
+            <a:tailEnd type="arrow"/>
+          </a:ln>
+        </p:spPr>
+        <p:style>
+          <a:lnRef idx="2">
+            <a:schemeClr val="accent1"/>
+          </a:lnRef>
+          <a:fillRef idx="0">
+            <a:schemeClr val="accent1"/>
+          </a:fillRef>
+          <a:effectRef idx="1">
+            <a:schemeClr val="accent1"/>
+          </a:effectRef>
+          <a:fontRef idx="minor">
+            <a:schemeClr val="tx1"/>
+          </a:fontRef>
+        </p:style>
+      </p:cxnSp>
+      <p:sp>
+        <p:nvSpPr>
+          <p:cNvPr id="48" name="TextBox 47"/>
+          <p:cNvSpPr txBox="1"/>
+          <p:nvPr/>
+        </p:nvSpPr>
+        <p:spPr>
+          <a:xfrm>
+            <a:off x="3938816" y="1170801"/>
+            <a:ext cx="1225065" cy="276999"/>
+          </a:xfrm>
+          <a:prstGeom prst="rect">
+            <a:avLst/>
+          </a:prstGeom>
+          <a:noFill/>
+        </p:spPr>
+        <p:txBody>
+          <a:bodyPr wrap="none" rtlCol="0">
+            <a:spAutoFit/>
+          </a:bodyPr>
+          <a:lstStyle/>
+          <a:p>
+            <a:r>
+              <a:rPr lang="en-US" sz="1200" dirty="0" smtClean="0"/>
+              <a:t>B: 15 km (varies)</a:t>
+            </a:r>
+            <a:endParaRPr lang="en-US" sz="1200" dirty="0"/>
+          </a:p>
+        </p:txBody>
+      </p:sp>
+      <p:cxnSp>
+        <p:nvCxnSpPr>
+          <p:cNvPr id="51" name="Straight Arrow Connector 50"/>
+          <p:cNvCxnSpPr/>
+          <p:nvPr/>
+        </p:nvCxnSpPr>
+        <p:spPr>
+          <a:xfrm flipV="1">
+            <a:off x="429399" y="1600201"/>
+            <a:ext cx="0" cy="2823864"/>
+          </a:xfrm>
+          <a:prstGeom prst="straightConnector1">
+            <a:avLst/>
+          </a:prstGeom>
+          <a:ln>
+            <a:solidFill>
+              <a:schemeClr val="tx1"/>
+            </a:solidFill>
+            <a:headEnd type="arrow"/>
+            <a:tailEnd type="arrow"/>
+          </a:ln>
+        </p:spPr>
+        <p:style>
+          <a:lnRef idx="2">
+            <a:schemeClr val="accent1"/>
+          </a:lnRef>
+          <a:fillRef idx="0">
+            <a:schemeClr val="accent1"/>
+          </a:fillRef>
+          <a:effectRef idx="1">
+            <a:schemeClr val="accent1"/>
+          </a:effectRef>
+          <a:fontRef idx="minor">
+            <a:schemeClr val="tx1"/>
+          </a:fontRef>
+        </p:style>
+      </p:cxnSp>
+      <p:sp>
+        <p:nvSpPr>
+          <p:cNvPr id="53" name="TextBox 52"/>
+          <p:cNvSpPr txBox="1"/>
+          <p:nvPr/>
+        </p:nvSpPr>
+        <p:spPr>
+          <a:xfrm rot="16200000">
+            <a:off x="-36286" y="2779486"/>
+            <a:ext cx="654371" cy="276999"/>
+          </a:xfrm>
+          <a:prstGeom prst="rect">
+            <a:avLst/>
+          </a:prstGeom>
+          <a:noFill/>
+        </p:spPr>
+        <p:txBody>
+          <a:bodyPr wrap="none" rtlCol="0">
+            <a:spAutoFit/>
+          </a:bodyPr>
+          <a:lstStyle/>
+          <a:p>
+            <a:r>
+              <a:rPr lang="en-US" sz="1200" dirty="0" smtClean="0"/>
+              <a:t>1100 m</a:t>
+            </a:r>
+            <a:endParaRPr lang="en-US" sz="1200" dirty="0"/>
+          </a:p>
+        </p:txBody>
+      </p:sp>
+      <p:sp>
+        <p:nvSpPr>
+          <p:cNvPr id="34" name="TextBox 33"/>
+          <p:cNvSpPr txBox="1"/>
+          <p:nvPr/>
+        </p:nvSpPr>
+        <p:spPr>
+          <a:xfrm>
+            <a:off x="304800" y="1219200"/>
+            <a:ext cx="3139033" cy="307777"/>
+          </a:xfrm>
+          <a:prstGeom prst="rect">
+            <a:avLst/>
+          </a:prstGeom>
+          <a:noFill/>
+        </p:spPr>
+        <p:txBody>
+          <a:bodyPr wrap="square" rtlCol="0">
+            <a:spAutoFit/>
+          </a:bodyPr>
+          <a:lstStyle/>
+          <a:p>
+            <a:r>
+              <a:rPr lang="en-US" sz="1400" b="1" dirty="0" smtClean="0"/>
+              <a:t>Test 2: Driven Cavity</a:t>
+            </a:r>
+            <a:endParaRPr lang="en-US" sz="1400" b="1" dirty="0"/>
+          </a:p>
+        </p:txBody>
+      </p:sp>
+      <p:sp>
+        <p:nvSpPr>
+          <p:cNvPr id="32" name="Right Arrow 31"/>
+          <p:cNvSpPr/>
+          <p:nvPr/>
+        </p:nvSpPr>
+        <p:spPr>
+          <a:xfrm>
+            <a:off x="5257800" y="1295400"/>
+            <a:ext cx="457200" cy="228600"/>
+          </a:xfrm>
+          <a:prstGeom prst="rightArrow">
+            <a:avLst/>
+          </a:prstGeom>
+          <a:gradFill>
+            <a:gsLst>
+              <a:gs pos="0">
+                <a:srgbClr val="FF0000"/>
+              </a:gs>
+              <a:gs pos="100000">
+                <a:schemeClr val="bg2"/>
+              </a:gs>
+            </a:gsLst>
+          </a:gradFill>
+        </p:spPr>
+        <p:style>
+          <a:lnRef idx="1">
+            <a:schemeClr val="accent1"/>
+          </a:lnRef>
+          <a:fillRef idx="3">
+            <a:schemeClr val="accent1"/>
+          </a:fillRef>
+          <a:effectRef idx="2">
+            <a:schemeClr val="accent1"/>
+          </a:effectRef>
+          <a:fontRef idx="minor">
+            <a:schemeClr val="lt1"/>
+          </a:fontRef>
+        </p:style>
+        <p:txBody>
+          <a:bodyPr rtlCol="0" anchor="ctr"/>
+          <a:lstStyle/>
+          <a:p>
+            <a:pPr algn="ctr"/>
+            <a:endParaRPr lang="en-US"/>
+          </a:p>
+        </p:txBody>
+      </p:sp>
+      <p:sp>
+        <p:nvSpPr>
+          <p:cNvPr id="33" name="Right Arrow 32"/>
+          <p:cNvSpPr/>
+          <p:nvPr/>
+        </p:nvSpPr>
+        <p:spPr>
+          <a:xfrm>
+            <a:off x="7467600" y="1295400"/>
+            <a:ext cx="457200" cy="228600"/>
+          </a:xfrm>
+          <a:prstGeom prst="rightArrow">
+            <a:avLst/>
+          </a:prstGeom>
+          <a:gradFill>
+            <a:gsLst>
+              <a:gs pos="0">
+                <a:srgbClr val="FF0000"/>
+              </a:gs>
+              <a:gs pos="100000">
+                <a:schemeClr val="bg2"/>
+              </a:gs>
+            </a:gsLst>
+          </a:gradFill>
+        </p:spPr>
+        <p:style>
+          <a:lnRef idx="1">
+            <a:schemeClr val="accent1"/>
+          </a:lnRef>
+          <a:fillRef idx="3">
+            <a:schemeClr val="accent1"/>
+          </a:fillRef>
+          <a:effectRef idx="2">
+            <a:schemeClr val="accent1"/>
+          </a:effectRef>
+          <a:fontRef idx="minor">
+            <a:schemeClr val="lt1"/>
+          </a:fontRef>
+        </p:style>
+        <p:txBody>
+          <a:bodyPr rtlCol="0" anchor="ctr"/>
+          <a:lstStyle/>
+          <a:p>
+            <a:pPr algn="ctr"/>
+            <a:endParaRPr lang="en-US"/>
+          </a:p>
+        </p:txBody>
+      </p:sp>
+      <p:sp>
+        <p:nvSpPr>
+          <p:cNvPr id="39" name="Right Arrow 38"/>
+          <p:cNvSpPr/>
+          <p:nvPr/>
+        </p:nvSpPr>
+        <p:spPr>
+          <a:xfrm>
+            <a:off x="6324600" y="1295400"/>
+            <a:ext cx="457200" cy="228600"/>
+          </a:xfrm>
+          <a:prstGeom prst="rightArrow">
+            <a:avLst/>
+          </a:prstGeom>
+          <a:gradFill>
+            <a:gsLst>
+              <a:gs pos="0">
+                <a:srgbClr val="FF0000"/>
+              </a:gs>
+              <a:gs pos="100000">
+                <a:schemeClr val="bg2"/>
+              </a:gs>
+            </a:gsLst>
+          </a:gradFill>
+        </p:spPr>
+        <p:style>
+          <a:lnRef idx="1">
+            <a:schemeClr val="accent1"/>
+          </a:lnRef>
+          <a:fillRef idx="3">
+            <a:schemeClr val="accent1"/>
+          </a:fillRef>
+          <a:effectRef idx="2">
+            <a:schemeClr val="accent1"/>
+          </a:effectRef>
+          <a:fontRef idx="minor">
+            <a:schemeClr val="lt1"/>
+          </a:fontRef>
+        </p:style>
+        <p:txBody>
+          <a:bodyPr rtlCol="0" anchor="ctr"/>
+          <a:lstStyle/>
+          <a:p>
+            <a:pPr algn="ctr"/>
+            <a:endParaRPr lang="en-US"/>
+          </a:p>
+        </p:txBody>
+      </p:sp>
+      <p:sp>
+        <p:nvSpPr>
+          <p:cNvPr id="41" name="TextBox 40"/>
+          <p:cNvSpPr txBox="1"/>
+          <p:nvPr/>
+        </p:nvSpPr>
+        <p:spPr>
+          <a:xfrm>
+            <a:off x="5029200" y="1600200"/>
+            <a:ext cx="3139033" cy="276999"/>
+          </a:xfrm>
+          <a:prstGeom prst="rect">
+            <a:avLst/>
+          </a:prstGeom>
+          <a:noFill/>
+        </p:spPr>
+        <p:txBody>
+          <a:bodyPr wrap="square" rtlCol="0">
+            <a:spAutoFit/>
+          </a:bodyPr>
+          <a:lstStyle/>
+          <a:p>
+            <a:r>
+              <a:rPr lang="en-US" sz="1200" dirty="0" smtClean="0"/>
+              <a:t>surface wind stress of 0.1 N/m</a:t>
+            </a:r>
+            <a:r>
+              <a:rPr lang="en-US" sz="1200" baseline="30000" dirty="0" smtClean="0"/>
+              <a:t>2</a:t>
+            </a:r>
+            <a:endParaRPr lang="en-US" sz="1200" baseline="30000" dirty="0"/>
+          </a:p>
+        </p:txBody>
+      </p:sp>
+      <p:sp>
+        <p:nvSpPr>
+          <p:cNvPr id="46" name="TextBox 45"/>
+          <p:cNvSpPr txBox="1"/>
+          <p:nvPr/>
+        </p:nvSpPr>
+        <p:spPr>
+          <a:xfrm>
+            <a:off x="1308492" y="4066401"/>
+            <a:ext cx="607859" cy="276999"/>
+          </a:xfrm>
+          <a:prstGeom prst="rect">
+            <a:avLst/>
+          </a:prstGeom>
+          <a:noFill/>
+        </p:spPr>
+        <p:txBody>
+          <a:bodyPr wrap="none" rtlCol="0">
+            <a:spAutoFit/>
+          </a:bodyPr>
+          <a:lstStyle/>
+          <a:p>
+            <a:r>
+              <a:rPr lang="en-US" sz="1200" dirty="0" smtClean="0"/>
+              <a:t>S=34.3</a:t>
+            </a:r>
+            <a:endParaRPr lang="en-US" sz="1200" dirty="0"/>
+          </a:p>
+        </p:txBody>
+      </p:sp>
+      <p:cxnSp>
+        <p:nvCxnSpPr>
+          <p:cNvPr id="49" name="Straight Arrow Connector 48"/>
+          <p:cNvCxnSpPr/>
+          <p:nvPr/>
+        </p:nvCxnSpPr>
+        <p:spPr>
+          <a:xfrm flipV="1">
+            <a:off x="429399" y="4724401"/>
+            <a:ext cx="0" cy="304799"/>
+          </a:xfrm>
+          <a:prstGeom prst="straightConnector1">
+            <a:avLst/>
+          </a:prstGeom>
+          <a:ln>
+            <a:solidFill>
+              <a:schemeClr val="tx1"/>
+            </a:solidFill>
+            <a:headEnd type="none"/>
+            <a:tailEnd type="arrow"/>
+          </a:ln>
+        </p:spPr>
+        <p:style>
+          <a:lnRef idx="2">
+            <a:schemeClr val="accent1"/>
+          </a:lnRef>
+          <a:fillRef idx="0">
+            <a:schemeClr val="accent1"/>
+          </a:fillRef>
+          <a:effectRef idx="1">
+            <a:schemeClr val="accent1"/>
+          </a:effectRef>
+          <a:fontRef idx="minor">
+            <a:schemeClr val="tx1"/>
+          </a:fontRef>
+        </p:style>
+      </p:cxnSp>
+      <p:cxnSp>
+        <p:nvCxnSpPr>
+          <p:cNvPr id="50" name="Straight Arrow Connector 49"/>
+          <p:cNvCxnSpPr/>
+          <p:nvPr/>
+        </p:nvCxnSpPr>
+        <p:spPr>
+          <a:xfrm rot="5400000" flipV="1">
+            <a:off x="581799" y="4876801"/>
+            <a:ext cx="0" cy="304799"/>
+          </a:xfrm>
+          <a:prstGeom prst="straightConnector1">
+            <a:avLst/>
+          </a:prstGeom>
+          <a:ln>
+            <a:solidFill>
+              <a:schemeClr val="tx1"/>
+            </a:solidFill>
+            <a:headEnd type="none"/>
+            <a:tailEnd type="arrow"/>
+          </a:ln>
+        </p:spPr>
+        <p:style>
+          <a:lnRef idx="2">
+            <a:schemeClr val="accent1"/>
+          </a:lnRef>
+          <a:fillRef idx="0">
+            <a:schemeClr val="accent1"/>
+          </a:fillRef>
+          <a:effectRef idx="1">
+            <a:schemeClr val="accent1"/>
+          </a:effectRef>
+          <a:fontRef idx="minor">
+            <a:schemeClr val="tx1"/>
+          </a:fontRef>
+        </p:style>
+      </p:cxnSp>
+      <p:sp>
+        <p:nvSpPr>
+          <p:cNvPr id="52" name="TextBox 51"/>
+          <p:cNvSpPr txBox="1"/>
+          <p:nvPr/>
+        </p:nvSpPr>
+        <p:spPr>
+          <a:xfrm>
+            <a:off x="657999" y="4828401"/>
+            <a:ext cx="317450" cy="276999"/>
+          </a:xfrm>
+          <a:prstGeom prst="rect">
+            <a:avLst/>
+          </a:prstGeom>
+          <a:noFill/>
+        </p:spPr>
+        <p:txBody>
+          <a:bodyPr wrap="none" rtlCol="0">
+            <a:spAutoFit/>
+          </a:bodyPr>
+          <a:lstStyle/>
+          <a:p>
+            <a:r>
+              <a:rPr lang="en-US" sz="1200" i="1" dirty="0" smtClean="0">
+                <a:latin typeface="Bookman Old Style"/>
+                <a:cs typeface="Bookman Old Style"/>
+              </a:rPr>
+              <a:t>y</a:t>
+            </a:r>
+            <a:endParaRPr lang="en-US" sz="1200" i="1" dirty="0">
+              <a:latin typeface="Bookman Old Style"/>
+              <a:cs typeface="Bookman Old Style"/>
+            </a:endParaRPr>
+          </a:p>
+        </p:txBody>
+      </p:sp>
+      <p:sp>
+        <p:nvSpPr>
+          <p:cNvPr id="54" name="TextBox 53"/>
+          <p:cNvSpPr txBox="1"/>
+          <p:nvPr/>
+        </p:nvSpPr>
+        <p:spPr>
+          <a:xfrm>
+            <a:off x="429399" y="4572000"/>
+            <a:ext cx="305127" cy="276999"/>
+          </a:xfrm>
+          <a:prstGeom prst="rect">
+            <a:avLst/>
+          </a:prstGeom>
+          <a:noFill/>
+        </p:spPr>
+        <p:txBody>
+          <a:bodyPr wrap="none" rtlCol="0">
+            <a:spAutoFit/>
+          </a:bodyPr>
+          <a:lstStyle/>
+          <a:p>
+            <a:r>
+              <a:rPr lang="en-US" sz="1200" i="1" dirty="0" smtClean="0">
+                <a:latin typeface="Bookman Old Style"/>
+                <a:cs typeface="Bookman Old Style"/>
+              </a:rPr>
+              <a:t>z</a:t>
+            </a:r>
+            <a:endParaRPr lang="en-US" sz="1200" i="1" dirty="0">
+              <a:latin typeface="Bookman Old Style"/>
+              <a:cs typeface="Bookman Old Style"/>
+            </a:endParaRPr>
+          </a:p>
+        </p:txBody>
+      </p:sp>
+      <p:sp>
+        <p:nvSpPr>
+          <p:cNvPr id="2" name="Curved Left Arrow 1"/>
+          <p:cNvSpPr/>
+          <p:nvPr/>
+        </p:nvSpPr>
+        <p:spPr>
+          <a:xfrm>
+            <a:off x="5791200" y="1932801"/>
+            <a:ext cx="2133600" cy="2313801"/>
+          </a:xfrm>
+          <a:prstGeom prst="curvedLeftArrow">
+            <a:avLst/>
+          </a:prstGeom>
+        </p:spPr>
+        <p:style>
+          <a:lnRef idx="1">
+            <a:schemeClr val="accent1"/>
+          </a:lnRef>
+          <a:fillRef idx="3">
+            <a:schemeClr val="accent1"/>
+          </a:fillRef>
+          <a:effectRef idx="2">
+            <a:schemeClr val="accent1"/>
+          </a:effectRef>
+          <a:fontRef idx="minor">
+            <a:schemeClr val="lt1"/>
+          </a:fontRef>
+        </p:style>
+        <p:txBody>
+          <a:bodyPr rtlCol="0" anchor="ctr"/>
+          <a:lstStyle/>
+          <a:p>
+            <a:pPr algn="ctr"/>
+            <a:endParaRPr lang="en-US">
+              <a:solidFill>
+                <a:schemeClr val="tx1"/>
+              </a:solidFill>
+            </a:endParaRPr>
+          </a:p>
+        </p:txBody>
+      </p:sp>
+      <p:sp>
+        <p:nvSpPr>
+          <p:cNvPr id="3" name="Curved Right Arrow 2"/>
+          <p:cNvSpPr/>
+          <p:nvPr/>
+        </p:nvSpPr>
+        <p:spPr>
+          <a:xfrm rot="20710543" flipV="1">
+            <a:off x="2735465" y="3062294"/>
+            <a:ext cx="1752600" cy="1295400"/>
+          </a:xfrm>
+          <a:prstGeom prst="curvedRightArrow">
+            <a:avLst/>
+          </a:prstGeom>
+        </p:spPr>
+        <p:style>
+          <a:lnRef idx="1">
+            <a:schemeClr val="accent1"/>
+          </a:lnRef>
+          <a:fillRef idx="3">
+            <a:schemeClr val="accent1"/>
+          </a:fillRef>
+          <a:effectRef idx="2">
+            <a:schemeClr val="accent1"/>
+          </a:effectRef>
+          <a:fontRef idx="minor">
+            <a:schemeClr val="lt1"/>
+          </a:fontRef>
+        </p:style>
+        <p:txBody>
+          <a:bodyPr rtlCol="0" anchor="ctr"/>
+          <a:lstStyle/>
+          <a:p>
+            <a:pPr algn="ctr"/>
+            <a:endParaRPr lang="en-US">
+              <a:solidFill>
+                <a:schemeClr val="tx1"/>
+              </a:solidFill>
+            </a:endParaRPr>
+          </a:p>
+        </p:txBody>
+      </p:sp>
+    </p:spTree>
+    <p:extLst>
+      <p:ext uri="{BB962C8B-B14F-4D97-AF65-F5344CB8AC3E}">
+        <p14:creationId xmlns:p14="http://schemas.microsoft.com/office/powerpoint/2010/main" val="2142944505"/>
+      </p:ext>
+    </p:extLst>
+  </p:cSld>
+  <p:clrMapOvr>
+    <a:masterClrMapping/>
+  </p:clrMapOvr>
+</p:sld>
+</file>
+
+<file path=ppt/slides/slide4.xml><?xml version="1.0" encoding="utf-8"?>
+<p:sld xmlns:a="http://schemas.openxmlformats.org/drawingml/2006/main" xmlns:r="http://schemas.openxmlformats.org/officeDocument/2006/relationships" xmlns:p="http://schemas.openxmlformats.org/presentationml/2006/main">
+  <p:cSld>
+    <p:spTree>
+      <p:nvGrpSpPr>
+        <p:cNvPr id="1" name=""/>
+        <p:cNvGrpSpPr/>
+        <p:nvPr/>
+      </p:nvGrpSpPr>
+      <p:grpSpPr>
+        <a:xfrm>
+          <a:off x="0" y="0"/>
+          <a:ext cx="0" cy="0"/>
+          <a:chOff x="0" y="0"/>
+          <a:chExt cx="0" cy="0"/>
+        </a:xfrm>
+      </p:grpSpPr>
+      <p:sp>
+        <p:nvSpPr>
+          <p:cNvPr id="6" name="Rectangle 5"/>
+          <p:cNvSpPr/>
+          <p:nvPr/>
+        </p:nvSpPr>
+        <p:spPr>
+          <a:xfrm>
+            <a:off x="1271816" y="1612900"/>
+            <a:ext cx="6769100" cy="2743200"/>
+          </a:xfrm>
+          <a:prstGeom prst="rect">
+            <a:avLst/>
+          </a:prstGeom>
+          <a:gradFill>
+            <a:gsLst>
+              <a:gs pos="0">
+                <a:schemeClr val="accent1">
+                  <a:lumMod val="75000"/>
+                </a:schemeClr>
+              </a:gs>
+              <a:gs pos="100000">
+                <a:schemeClr val="accent1">
+                  <a:lumMod val="40000"/>
+                  <a:lumOff val="60000"/>
+                </a:schemeClr>
+              </a:gs>
+            </a:gsLst>
+          </a:gradFill>
+        </p:spPr>
+        <p:style>
+          <a:lnRef idx="1">
+            <a:schemeClr val="accent1"/>
+          </a:lnRef>
+          <a:fillRef idx="3">
+            <a:schemeClr val="accent1"/>
+          </a:fillRef>
+          <a:effectRef idx="2">
+            <a:schemeClr val="accent1"/>
+          </a:effectRef>
+          <a:fontRef idx="minor">
+            <a:schemeClr val="lt1"/>
+          </a:fontRef>
+        </p:style>
+        <p:txBody>
+          <a:bodyPr rtlCol="0" anchor="ctr"/>
+          <a:lstStyle/>
+          <a:p>
+            <a:pPr algn="ctr"/>
+            <a:endParaRPr lang="en-US"/>
+          </a:p>
+        </p:txBody>
+      </p:sp>
+      <p:sp>
+        <p:nvSpPr>
+          <p:cNvPr id="7" name="Freeform 6"/>
+          <p:cNvSpPr/>
+          <p:nvPr/>
+        </p:nvSpPr>
+        <p:spPr>
+          <a:xfrm>
+            <a:off x="1271816" y="1600200"/>
+            <a:ext cx="3638550" cy="2362200"/>
+          </a:xfrm>
+          <a:custGeom>
+            <a:avLst/>
+            <a:gdLst>
+              <a:gd name="connsiteX0" fmla="*/ 0 w 3498850"/>
+              <a:gd name="connsiteY0" fmla="*/ 0 h 2362200"/>
+              <a:gd name="connsiteX1" fmla="*/ 12700 w 3498850"/>
+              <a:gd name="connsiteY1" fmla="*/ 2355850 h 2362200"/>
+              <a:gd name="connsiteX2" fmla="*/ 793750 w 3498850"/>
+              <a:gd name="connsiteY2" fmla="*/ 2362200 h 2362200"/>
+              <a:gd name="connsiteX3" fmla="*/ 2641600 w 3498850"/>
+              <a:gd name="connsiteY3" fmla="*/ 1206500 h 2362200"/>
+              <a:gd name="connsiteX4" fmla="*/ 3498850 w 3498850"/>
+              <a:gd name="connsiteY4" fmla="*/ 12700 h 2362200"/>
+              <a:gd name="connsiteX5" fmla="*/ 0 w 3498850"/>
+              <a:gd name="connsiteY5" fmla="*/ 0 h 2362200"/>
+            </a:gdLst>
+            <a:ahLst/>
+            <a:cxnLst>
+              <a:cxn ang="0">
+                <a:pos x="connsiteX0" y="connsiteY0"/>
+              </a:cxn>
+              <a:cxn ang="0">
+                <a:pos x="connsiteX1" y="connsiteY1"/>
+              </a:cxn>
+              <a:cxn ang="0">
+                <a:pos x="connsiteX2" y="connsiteY2"/>
+              </a:cxn>
+              <a:cxn ang="0">
+                <a:pos x="connsiteX3" y="connsiteY3"/>
+              </a:cxn>
+              <a:cxn ang="0">
+                <a:pos x="connsiteX4" y="connsiteY4"/>
+              </a:cxn>
+              <a:cxn ang="0">
+                <a:pos x="connsiteX5" y="connsiteY5"/>
+              </a:cxn>
+            </a:cxnLst>
+            <a:rect l="l" t="t" r="r" b="b"/>
+            <a:pathLst>
+              <a:path w="3498850" h="2362200">
+                <a:moveTo>
+                  <a:pt x="0" y="0"/>
+                </a:moveTo>
+                <a:cubicBezTo>
+                  <a:pt x="4233" y="785283"/>
+                  <a:pt x="8467" y="1570567"/>
+                  <a:pt x="12700" y="2355850"/>
+                </a:cubicBezTo>
+                <a:lnTo>
+                  <a:pt x="793750" y="2362200"/>
+                </a:lnTo>
+                <a:lnTo>
+                  <a:pt x="2641600" y="1206500"/>
+                </a:lnTo>
+                <a:lnTo>
+                  <a:pt x="3498850" y="12700"/>
+                </a:lnTo>
+                <a:lnTo>
+                  <a:pt x="0" y="0"/>
+                </a:lnTo>
+                <a:close/>
+              </a:path>
+            </a:pathLst>
+          </a:custGeom>
+          <a:gradFill>
+            <a:gsLst>
+              <a:gs pos="0">
+                <a:schemeClr val="bg1">
+                  <a:lumMod val="75000"/>
+                </a:schemeClr>
+              </a:gs>
+              <a:gs pos="100000">
+                <a:schemeClr val="bg1">
+                  <a:lumMod val="95000"/>
+                </a:schemeClr>
+              </a:gs>
+            </a:gsLst>
+          </a:gradFill>
+        </p:spPr>
+        <p:style>
+          <a:lnRef idx="1">
+            <a:schemeClr val="accent1"/>
+          </a:lnRef>
+          <a:fillRef idx="3">
+            <a:schemeClr val="accent1"/>
+          </a:fillRef>
+          <a:effectRef idx="2">
+            <a:schemeClr val="accent1"/>
+          </a:effectRef>
+          <a:fontRef idx="minor">
+            <a:schemeClr val="lt1"/>
+          </a:fontRef>
+        </p:style>
+        <p:txBody>
+          <a:bodyPr rtlCol="0" anchor="ctr"/>
+          <a:lstStyle/>
+          <a:p>
+            <a:pPr algn="ctr"/>
+            <a:endParaRPr lang="en-US"/>
+          </a:p>
+        </p:txBody>
+      </p:sp>
+      <p:cxnSp>
+        <p:nvCxnSpPr>
+          <p:cNvPr id="11" name="Straight Arrow Connector 10"/>
+          <p:cNvCxnSpPr/>
+          <p:nvPr/>
+        </p:nvCxnSpPr>
+        <p:spPr>
+          <a:xfrm>
+            <a:off x="1285023" y="4724400"/>
+            <a:ext cx="1794961" cy="0"/>
+          </a:xfrm>
+          <a:prstGeom prst="straightConnector1">
+            <a:avLst/>
+          </a:prstGeom>
+          <a:ln>
+            <a:solidFill>
+              <a:schemeClr val="tx1"/>
+            </a:solidFill>
+            <a:headEnd type="arrow"/>
+            <a:tailEnd type="arrow"/>
+          </a:ln>
+        </p:spPr>
+        <p:style>
+          <a:lnRef idx="2">
+            <a:schemeClr val="accent1"/>
+          </a:lnRef>
+          <a:fillRef idx="0">
+            <a:schemeClr val="accent1"/>
+          </a:fillRef>
+          <a:effectRef idx="1">
+            <a:schemeClr val="accent1"/>
+          </a:effectRef>
+          <a:fontRef idx="minor">
+            <a:schemeClr val="tx1"/>
+          </a:fontRef>
+        </p:style>
+      </p:cxnSp>
+      <p:cxnSp>
+        <p:nvCxnSpPr>
+          <p:cNvPr id="13" name="Straight Arrow Connector 12"/>
+          <p:cNvCxnSpPr/>
+          <p:nvPr/>
+        </p:nvCxnSpPr>
+        <p:spPr>
+          <a:xfrm>
+            <a:off x="3124200" y="4724400"/>
+            <a:ext cx="2209800" cy="0"/>
+          </a:xfrm>
+          <a:prstGeom prst="straightConnector1">
+            <a:avLst/>
+          </a:prstGeom>
+          <a:ln>
+            <a:solidFill>
+              <a:schemeClr val="tx1"/>
+            </a:solidFill>
+            <a:headEnd type="arrow"/>
+            <a:tailEnd type="arrow"/>
+          </a:ln>
+        </p:spPr>
+        <p:style>
+          <a:lnRef idx="2">
+            <a:schemeClr val="accent1"/>
+          </a:lnRef>
+          <a:fillRef idx="0">
+            <a:schemeClr val="accent1"/>
+          </a:fillRef>
+          <a:effectRef idx="1">
+            <a:schemeClr val="accent1"/>
+          </a:effectRef>
+          <a:fontRef idx="minor">
+            <a:schemeClr val="tx1"/>
+          </a:fontRef>
+        </p:style>
+      </p:cxnSp>
+      <p:sp>
+        <p:nvSpPr>
+          <p:cNvPr id="18" name="TextBox 17"/>
+          <p:cNvSpPr txBox="1"/>
+          <p:nvPr/>
+        </p:nvSpPr>
+        <p:spPr>
+          <a:xfrm>
+            <a:off x="1870065" y="4419600"/>
+            <a:ext cx="568335" cy="276999"/>
+          </a:xfrm>
+          <a:prstGeom prst="rect">
+            <a:avLst/>
+          </a:prstGeom>
+          <a:noFill/>
+        </p:spPr>
+        <p:txBody>
+          <a:bodyPr wrap="none" rtlCol="0">
+            <a:spAutoFit/>
+          </a:bodyPr>
+          <a:lstStyle/>
+          <a:p>
+            <a:r>
+              <a:rPr lang="en-US" sz="1200" dirty="0" smtClean="0"/>
+              <a:t>30 km</a:t>
+            </a:r>
+            <a:endParaRPr lang="en-US" sz="1200" dirty="0"/>
+          </a:p>
+        </p:txBody>
+      </p:sp>
+      <p:cxnSp>
+        <p:nvCxnSpPr>
+          <p:cNvPr id="19" name="Straight Arrow Connector 18"/>
+          <p:cNvCxnSpPr/>
+          <p:nvPr/>
+        </p:nvCxnSpPr>
+        <p:spPr>
+          <a:xfrm>
+            <a:off x="1285023" y="5029200"/>
+            <a:ext cx="6755893" cy="0"/>
+          </a:xfrm>
+          <a:prstGeom prst="straightConnector1">
+            <a:avLst/>
+          </a:prstGeom>
+          <a:ln>
+            <a:solidFill>
+              <a:schemeClr val="tx1"/>
+            </a:solidFill>
+            <a:headEnd type="arrow"/>
+            <a:tailEnd type="arrow"/>
+          </a:ln>
+        </p:spPr>
+        <p:style>
+          <a:lnRef idx="2">
+            <a:schemeClr val="accent1"/>
+          </a:lnRef>
+          <a:fillRef idx="0">
+            <a:schemeClr val="accent1"/>
+          </a:fillRef>
+          <a:effectRef idx="1">
+            <a:schemeClr val="accent1"/>
+          </a:effectRef>
+          <a:fontRef idx="minor">
+            <a:schemeClr val="tx1"/>
+          </a:fontRef>
+        </p:style>
+      </p:cxnSp>
+      <p:sp>
+        <p:nvSpPr>
+          <p:cNvPr id="21" name="TextBox 20"/>
+          <p:cNvSpPr txBox="1"/>
+          <p:nvPr/>
+        </p:nvSpPr>
+        <p:spPr>
+          <a:xfrm>
+            <a:off x="3786416" y="4752201"/>
+            <a:ext cx="646331" cy="276999"/>
+          </a:xfrm>
+          <a:prstGeom prst="rect">
+            <a:avLst/>
+          </a:prstGeom>
+          <a:noFill/>
+        </p:spPr>
+        <p:txBody>
+          <a:bodyPr wrap="none" rtlCol="0">
+            <a:spAutoFit/>
+          </a:bodyPr>
+          <a:lstStyle/>
+          <a:p>
+            <a:r>
+              <a:rPr lang="en-US" sz="1200" dirty="0" smtClean="0"/>
+              <a:t>200 km</a:t>
+            </a:r>
+            <a:endParaRPr lang="en-US" sz="1200" dirty="0"/>
+          </a:p>
+        </p:txBody>
+      </p:sp>
+      <p:sp>
+        <p:nvSpPr>
+          <p:cNvPr id="44" name="TextBox 43"/>
+          <p:cNvSpPr txBox="1"/>
+          <p:nvPr/>
+        </p:nvSpPr>
+        <p:spPr>
+          <a:xfrm>
+            <a:off x="1485582" y="1600200"/>
+            <a:ext cx="3139033" cy="276999"/>
+          </a:xfrm>
+          <a:prstGeom prst="rect">
+            <a:avLst/>
+          </a:prstGeom>
+          <a:noFill/>
+        </p:spPr>
+        <p:txBody>
+          <a:bodyPr wrap="square" rtlCol="0">
+            <a:spAutoFit/>
+          </a:bodyPr>
+          <a:lstStyle/>
+          <a:p>
+            <a:r>
+              <a:rPr lang="en-US" sz="1200" dirty="0" smtClean="0"/>
+              <a:t>ice shelf, imposed by surface pressure</a:t>
+            </a:r>
+            <a:endParaRPr lang="en-US" sz="1200" dirty="0"/>
+          </a:p>
+        </p:txBody>
+      </p:sp>
+      <p:cxnSp>
+        <p:nvCxnSpPr>
+          <p:cNvPr id="51" name="Straight Arrow Connector 50"/>
+          <p:cNvCxnSpPr/>
+          <p:nvPr/>
+        </p:nvCxnSpPr>
+        <p:spPr>
+          <a:xfrm flipV="1">
+            <a:off x="1066800" y="1600201"/>
+            <a:ext cx="0" cy="2823864"/>
+          </a:xfrm>
+          <a:prstGeom prst="straightConnector1">
+            <a:avLst/>
+          </a:prstGeom>
+          <a:ln>
+            <a:solidFill>
+              <a:schemeClr val="tx1"/>
+            </a:solidFill>
+            <a:headEnd type="arrow"/>
+            <a:tailEnd type="arrow"/>
+          </a:ln>
+        </p:spPr>
+        <p:style>
+          <a:lnRef idx="2">
+            <a:schemeClr val="accent1"/>
+          </a:lnRef>
+          <a:fillRef idx="0">
+            <a:schemeClr val="accent1"/>
+          </a:fillRef>
+          <a:effectRef idx="1">
+            <a:schemeClr val="accent1"/>
+          </a:effectRef>
+          <a:fontRef idx="minor">
+            <a:schemeClr val="tx1"/>
+          </a:fontRef>
+        </p:style>
+      </p:cxnSp>
+      <p:sp>
+        <p:nvSpPr>
           <p:cNvPr id="53" name="TextBox 52"/>
           <p:cNvSpPr txBox="1"/>
           <p:nvPr/>
@@ -4817,8 +7839,8 @@
         </p:nvSpPr>
         <p:spPr>
           <a:xfrm>
-            <a:off x="3048000" y="3270250"/>
-            <a:ext cx="4648200" cy="1085850"/>
+            <a:off x="3048000" y="3505200"/>
+            <a:ext cx="4648200" cy="850900"/>
           </a:xfrm>
           <a:custGeom>
             <a:avLst/>
@@ -5150,8 +8172,8 @@
         </p:nvCxnSpPr>
         <p:spPr>
           <a:xfrm flipV="1">
-            <a:off x="5257800" y="3245171"/>
-            <a:ext cx="0" cy="1131106"/>
+            <a:off x="5257800" y="3505200"/>
+            <a:ext cx="0" cy="871077"/>
           </a:xfrm>
           <a:prstGeom prst="straightConnector1">
             <a:avLst/>
@@ -5204,6 +8226,218 @@
             <a:r>
               <a:rPr lang="en-US" sz="1200" dirty="0" smtClean="0"/>
               <a:t>250 km</a:t>
+            </a:r>
+            <a:endParaRPr lang="en-US" sz="1200" dirty="0"/>
+          </a:p>
+        </p:txBody>
+      </p:sp>
+      <p:sp>
+        <p:nvSpPr>
+          <p:cNvPr id="52" name="TextBox 51"/>
+          <p:cNvSpPr txBox="1"/>
+          <p:nvPr/>
+        </p:nvSpPr>
+        <p:spPr>
+          <a:xfrm>
+            <a:off x="304800" y="1219200"/>
+            <a:ext cx="3139033" cy="307777"/>
+          </a:xfrm>
+          <a:prstGeom prst="rect">
+            <a:avLst/>
+          </a:prstGeom>
+          <a:noFill/>
+        </p:spPr>
+        <p:txBody>
+          <a:bodyPr wrap="square" rtlCol="0">
+            <a:spAutoFit/>
+          </a:bodyPr>
+          <a:lstStyle/>
+          <a:p>
+            <a:r>
+              <a:rPr lang="en-US" sz="1400" b="1" dirty="0" smtClean="0"/>
+              <a:t>Test 3: Addition of bottom topography</a:t>
+            </a:r>
+            <a:endParaRPr lang="en-US" sz="1400" b="1" dirty="0"/>
+          </a:p>
+        </p:txBody>
+      </p:sp>
+      <p:cxnSp>
+        <p:nvCxnSpPr>
+          <p:cNvPr id="54" name="Straight Arrow Connector 53"/>
+          <p:cNvCxnSpPr/>
+          <p:nvPr/>
+        </p:nvCxnSpPr>
+        <p:spPr>
+          <a:xfrm flipV="1">
+            <a:off x="429399" y="4724401"/>
+            <a:ext cx="0" cy="304799"/>
+          </a:xfrm>
+          <a:prstGeom prst="straightConnector1">
+            <a:avLst/>
+          </a:prstGeom>
+          <a:ln>
+            <a:solidFill>
+              <a:schemeClr val="tx1"/>
+            </a:solidFill>
+            <a:headEnd type="none"/>
+            <a:tailEnd type="arrow"/>
+          </a:ln>
+        </p:spPr>
+        <p:style>
+          <a:lnRef idx="2">
+            <a:schemeClr val="accent1"/>
+          </a:lnRef>
+          <a:fillRef idx="0">
+            <a:schemeClr val="accent1"/>
+          </a:fillRef>
+          <a:effectRef idx="1">
+            <a:schemeClr val="accent1"/>
+          </a:effectRef>
+          <a:fontRef idx="minor">
+            <a:schemeClr val="tx1"/>
+          </a:fontRef>
+        </p:style>
+      </p:cxnSp>
+      <p:cxnSp>
+        <p:nvCxnSpPr>
+          <p:cNvPr id="55" name="Straight Arrow Connector 54"/>
+          <p:cNvCxnSpPr/>
+          <p:nvPr/>
+        </p:nvCxnSpPr>
+        <p:spPr>
+          <a:xfrm rot="5400000" flipV="1">
+            <a:off x="581799" y="4876801"/>
+            <a:ext cx="0" cy="304799"/>
+          </a:xfrm>
+          <a:prstGeom prst="straightConnector1">
+            <a:avLst/>
+          </a:prstGeom>
+          <a:ln>
+            <a:solidFill>
+              <a:schemeClr val="tx1"/>
+            </a:solidFill>
+            <a:headEnd type="none"/>
+            <a:tailEnd type="arrow"/>
+          </a:ln>
+        </p:spPr>
+        <p:style>
+          <a:lnRef idx="2">
+            <a:schemeClr val="accent1"/>
+          </a:lnRef>
+          <a:fillRef idx="0">
+            <a:schemeClr val="accent1"/>
+          </a:fillRef>
+          <a:effectRef idx="1">
+            <a:schemeClr val="accent1"/>
+          </a:effectRef>
+          <a:fontRef idx="minor">
+            <a:schemeClr val="tx1"/>
+          </a:fontRef>
+        </p:style>
+      </p:cxnSp>
+      <p:sp>
+        <p:nvSpPr>
+          <p:cNvPr id="56" name="TextBox 55"/>
+          <p:cNvSpPr txBox="1"/>
+          <p:nvPr/>
+        </p:nvSpPr>
+        <p:spPr>
+          <a:xfrm>
+            <a:off x="657999" y="4828401"/>
+            <a:ext cx="317450" cy="276999"/>
+          </a:xfrm>
+          <a:prstGeom prst="rect">
+            <a:avLst/>
+          </a:prstGeom>
+          <a:noFill/>
+        </p:spPr>
+        <p:txBody>
+          <a:bodyPr wrap="none" rtlCol="0">
+            <a:spAutoFit/>
+          </a:bodyPr>
+          <a:lstStyle/>
+          <a:p>
+            <a:r>
+              <a:rPr lang="en-US" sz="1200" i="1" dirty="0" smtClean="0">
+                <a:latin typeface="Bookman Old Style"/>
+                <a:cs typeface="Bookman Old Style"/>
+              </a:rPr>
+              <a:t>y</a:t>
+            </a:r>
+            <a:endParaRPr lang="en-US" sz="1200" i="1" dirty="0">
+              <a:latin typeface="Bookman Old Style"/>
+              <a:cs typeface="Bookman Old Style"/>
+            </a:endParaRPr>
+          </a:p>
+        </p:txBody>
+      </p:sp>
+      <p:sp>
+        <p:nvSpPr>
+          <p:cNvPr id="57" name="TextBox 56"/>
+          <p:cNvSpPr txBox="1"/>
+          <p:nvPr/>
+        </p:nvSpPr>
+        <p:spPr>
+          <a:xfrm>
+            <a:off x="429399" y="4572000"/>
+            <a:ext cx="305127" cy="276999"/>
+          </a:xfrm>
+          <a:prstGeom prst="rect">
+            <a:avLst/>
+          </a:prstGeom>
+          <a:noFill/>
+        </p:spPr>
+        <p:txBody>
+          <a:bodyPr wrap="none" rtlCol="0">
+            <a:spAutoFit/>
+          </a:bodyPr>
+          <a:lstStyle/>
+          <a:p>
+            <a:r>
+              <a:rPr lang="en-US" sz="1200" i="1" dirty="0" smtClean="0">
+                <a:latin typeface="Bookman Old Style"/>
+                <a:cs typeface="Bookman Old Style"/>
+              </a:rPr>
+              <a:t>z</a:t>
+            </a:r>
+            <a:endParaRPr lang="en-US" sz="1200" i="1" dirty="0">
+              <a:latin typeface="Bookman Old Style"/>
+              <a:cs typeface="Bookman Old Style"/>
+            </a:endParaRPr>
+          </a:p>
+        </p:txBody>
+      </p:sp>
+      <p:sp>
+        <p:nvSpPr>
+          <p:cNvPr id="58" name="TextBox 57"/>
+          <p:cNvSpPr txBox="1"/>
+          <p:nvPr/>
+        </p:nvSpPr>
+        <p:spPr>
+          <a:xfrm>
+            <a:off x="4994974" y="2590800"/>
+            <a:ext cx="1767433" cy="461665"/>
+          </a:xfrm>
+          <a:prstGeom prst="rect">
+            <a:avLst/>
+          </a:prstGeom>
+          <a:noFill/>
+        </p:spPr>
+        <p:txBody>
+          <a:bodyPr wrap="square" rtlCol="0">
+            <a:spAutoFit/>
+          </a:bodyPr>
+          <a:lstStyle/>
+          <a:p>
+            <a:r>
+              <a:rPr lang="en-US" sz="1200" dirty="0" smtClean="0"/>
+              <a:t>MPAS-Ocean model </a:t>
+            </a:r>
+          </a:p>
+          <a:p>
+            <a:r>
+              <a:rPr lang="en-US" sz="1200" dirty="0" smtClean="0"/>
+              <a:t>22 layers, 50 m each </a:t>
             </a:r>
             <a:endParaRPr lang="en-US" sz="1200" dirty="0"/>
           </a:p>

</xml_diff>